<commit_message>
Correcting the histogram plots of the presenation slides of April 25 and April 30. Uploading the slides of the meeting on May 07
</commit_message>
<xml_diff>
--- a/Faysal/Weekly_Meeting_210425.pptx
+++ b/Faysal/Weekly_Meeting_210425.pptx
@@ -128,419 +128,16 @@
 </p:presentation>
 </file>
 
+<file path=ppt/revisionInfo.xml><?xml version="1.0" encoding="utf-8"?>
+<p1510:revInfo xmlns:a="http://schemas.openxmlformats.org/drawingml/2006/main" xmlns:r="http://schemas.openxmlformats.org/officeDocument/2006/relationships" xmlns:p1510="http://schemas.microsoft.com/office/powerpoint/2015/10/main">
+  <p1510:revLst>
+    <p1510:client id="{2249E5F1-46C3-4B03-B08E-8C23AE925CD5}" v="8" dt="2021-05-07T17:18:28.322"/>
+  </p1510:revLst>
+</p1510:revInfo>
+</file>
+
 <file path=ppt/changesInfos/changesInfo1.xml><?xml version="1.0" encoding="utf-8"?>
 <pc:chgInfo xmlns:a="http://schemas.openxmlformats.org/drawingml/2006/main" xmlns:r="http://schemas.openxmlformats.org/officeDocument/2006/relationships" xmlns:ac="http://schemas.microsoft.com/office/drawing/2013/main/command" xmlns:pc="http://schemas.microsoft.com/office/powerpoint/2013/main/command">
-  <pc:docChgLst>
-    <pc:chgData name="Md Kauser Ahmmed" userId="81e39d19-8d5c-4ffe-9a82-20799efac8e0" providerId="ADAL" clId="{3A55CCAE-749B-4817-8638-97B22656D31F}"/>
-    <pc:docChg chg="undo custSel mod addSld delSld modSld sldOrd">
-      <pc:chgData name="Md Kauser Ahmmed" userId="81e39d19-8d5c-4ffe-9a82-20799efac8e0" providerId="ADAL" clId="{3A55CCAE-749B-4817-8638-97B22656D31F}" dt="2020-09-18T17:29:01.843" v="942" actId="20577"/>
-      <pc:docMkLst>
-        <pc:docMk/>
-      </pc:docMkLst>
-      <pc:sldChg chg="modSp">
-        <pc:chgData name="Md Kauser Ahmmed" userId="81e39d19-8d5c-4ffe-9a82-20799efac8e0" providerId="ADAL" clId="{3A55CCAE-749B-4817-8638-97B22656D31F}" dt="2020-09-18T15:29:41.932" v="631" actId="20577"/>
-        <pc:sldMkLst>
-          <pc:docMk/>
-          <pc:sldMk cId="1659930921" sldId="256"/>
-        </pc:sldMkLst>
-        <pc:spChg chg="mod">
-          <ac:chgData name="Md Kauser Ahmmed" userId="81e39d19-8d5c-4ffe-9a82-20799efac8e0" providerId="ADAL" clId="{3A55CCAE-749B-4817-8638-97B22656D31F}" dt="2020-09-18T15:29:41.932" v="631" actId="20577"/>
-          <ac:spMkLst>
-            <pc:docMk/>
-            <pc:sldMk cId="1659930921" sldId="256"/>
-            <ac:spMk id="6" creationId="{1EEBDA52-BE46-433D-AB6E-4D2949F916FF}"/>
-          </ac:spMkLst>
-        </pc:spChg>
-      </pc:sldChg>
-      <pc:sldChg chg="addSp delSp modSp">
-        <pc:chgData name="Md Kauser Ahmmed" userId="81e39d19-8d5c-4ffe-9a82-20799efac8e0" providerId="ADAL" clId="{3A55CCAE-749B-4817-8638-97B22656D31F}" dt="2020-09-18T15:34:16.966" v="758" actId="26606"/>
-        <pc:sldMkLst>
-          <pc:docMk/>
-          <pc:sldMk cId="4056875156" sldId="259"/>
-        </pc:sldMkLst>
-        <pc:spChg chg="mod">
-          <ac:chgData name="Md Kauser Ahmmed" userId="81e39d19-8d5c-4ffe-9a82-20799efac8e0" providerId="ADAL" clId="{3A55CCAE-749B-4817-8638-97B22656D31F}" dt="2020-09-18T15:34:16.966" v="758" actId="26606"/>
-          <ac:spMkLst>
-            <pc:docMk/>
-            <pc:sldMk cId="4056875156" sldId="259"/>
-            <ac:spMk id="2" creationId="{45F2AC63-EFDA-4E7C-A71C-7D3EE46A34E8}"/>
-          </ac:spMkLst>
-        </pc:spChg>
-        <pc:spChg chg="del">
-          <ac:chgData name="Md Kauser Ahmmed" userId="81e39d19-8d5c-4ffe-9a82-20799efac8e0" providerId="ADAL" clId="{3A55CCAE-749B-4817-8638-97B22656D31F}" dt="2020-09-18T15:34:16.966" v="758" actId="26606"/>
-          <ac:spMkLst>
-            <pc:docMk/>
-            <pc:sldMk cId="4056875156" sldId="259"/>
-            <ac:spMk id="26" creationId="{53F29798-D584-4792-9B62-3F5F5C36D619}"/>
-          </ac:spMkLst>
-        </pc:spChg>
-        <pc:spChg chg="add">
-          <ac:chgData name="Md Kauser Ahmmed" userId="81e39d19-8d5c-4ffe-9a82-20799efac8e0" providerId="ADAL" clId="{3A55CCAE-749B-4817-8638-97B22656D31F}" dt="2020-09-18T15:34:16.966" v="758" actId="26606"/>
-          <ac:spMkLst>
-            <pc:docMk/>
-            <pc:sldMk cId="4056875156" sldId="259"/>
-            <ac:spMk id="31" creationId="{53F29798-D584-4792-9B62-3F5F5C36D619}"/>
-          </ac:spMkLst>
-        </pc:spChg>
-        <pc:picChg chg="add mod">
-          <ac:chgData name="Md Kauser Ahmmed" userId="81e39d19-8d5c-4ffe-9a82-20799efac8e0" providerId="ADAL" clId="{3A55CCAE-749B-4817-8638-97B22656D31F}" dt="2020-09-18T15:34:16.966" v="758" actId="26606"/>
-          <ac:picMkLst>
-            <pc:docMk/>
-            <pc:sldMk cId="4056875156" sldId="259"/>
-            <ac:picMk id="4" creationId="{6751950B-22EC-40E1-A4ED-E4FEC7C2E08A}"/>
-          </ac:picMkLst>
-        </pc:picChg>
-        <pc:picChg chg="del">
-          <ac:chgData name="Md Kauser Ahmmed" userId="81e39d19-8d5c-4ffe-9a82-20799efac8e0" providerId="ADAL" clId="{3A55CCAE-749B-4817-8638-97B22656D31F}" dt="2020-09-18T15:31:08.905" v="632" actId="478"/>
-          <ac:picMkLst>
-            <pc:docMk/>
-            <pc:sldMk cId="4056875156" sldId="259"/>
-            <ac:picMk id="8" creationId="{56610AC1-0979-421C-8184-70A320D5905D}"/>
-          </ac:picMkLst>
-        </pc:picChg>
-      </pc:sldChg>
-      <pc:sldChg chg="modSp">
-        <pc:chgData name="Md Kauser Ahmmed" userId="81e39d19-8d5c-4ffe-9a82-20799efac8e0" providerId="ADAL" clId="{3A55CCAE-749B-4817-8638-97B22656D31F}" dt="2020-09-18T17:29:01.843" v="942" actId="20577"/>
-        <pc:sldMkLst>
-          <pc:docMk/>
-          <pc:sldMk cId="1010047731" sldId="271"/>
-        </pc:sldMkLst>
-        <pc:spChg chg="mod">
-          <ac:chgData name="Md Kauser Ahmmed" userId="81e39d19-8d5c-4ffe-9a82-20799efac8e0" providerId="ADAL" clId="{3A55CCAE-749B-4817-8638-97B22656D31F}" dt="2020-09-18T17:29:01.843" v="942" actId="20577"/>
-          <ac:spMkLst>
-            <pc:docMk/>
-            <pc:sldMk cId="1010047731" sldId="271"/>
-            <ac:spMk id="3" creationId="{771893B1-979C-4E59-951A-F29EB496A9C1}"/>
-          </ac:spMkLst>
-        </pc:spChg>
-      </pc:sldChg>
-      <pc:sldChg chg="modSp">
-        <pc:chgData name="Md Kauser Ahmmed" userId="81e39d19-8d5c-4ffe-9a82-20799efac8e0" providerId="ADAL" clId="{3A55CCAE-749B-4817-8638-97B22656D31F}" dt="2020-09-17T21:36:16.253" v="137" actId="207"/>
-        <pc:sldMkLst>
-          <pc:docMk/>
-          <pc:sldMk cId="1493241202" sldId="289"/>
-        </pc:sldMkLst>
-        <pc:spChg chg="mod">
-          <ac:chgData name="Md Kauser Ahmmed" userId="81e39d19-8d5c-4ffe-9a82-20799efac8e0" providerId="ADAL" clId="{3A55CCAE-749B-4817-8638-97B22656D31F}" dt="2020-09-17T21:36:16.253" v="137" actId="207"/>
-          <ac:spMkLst>
-            <pc:docMk/>
-            <pc:sldMk cId="1493241202" sldId="289"/>
-            <ac:spMk id="3" creationId="{FAF7EFD8-937E-4485-A5BE-D7EBC0477783}"/>
-          </ac:spMkLst>
-        </pc:spChg>
-      </pc:sldChg>
-      <pc:sldChg chg="modSp">
-        <pc:chgData name="Md Kauser Ahmmed" userId="81e39d19-8d5c-4ffe-9a82-20799efac8e0" providerId="ADAL" clId="{3A55CCAE-749B-4817-8638-97B22656D31F}" dt="2020-09-17T21:37:05.602" v="141" actId="207"/>
-        <pc:sldMkLst>
-          <pc:docMk/>
-          <pc:sldMk cId="3625187802" sldId="290"/>
-        </pc:sldMkLst>
-        <pc:spChg chg="mod">
-          <ac:chgData name="Md Kauser Ahmmed" userId="81e39d19-8d5c-4ffe-9a82-20799efac8e0" providerId="ADAL" clId="{3A55CCAE-749B-4817-8638-97B22656D31F}" dt="2020-09-17T21:37:05.602" v="141" actId="207"/>
-          <ac:spMkLst>
-            <pc:docMk/>
-            <pc:sldMk cId="3625187802" sldId="290"/>
-            <ac:spMk id="3" creationId="{64F80B61-502D-47EC-86FD-28DA3D65A610}"/>
-          </ac:spMkLst>
-        </pc:spChg>
-      </pc:sldChg>
-      <pc:sldChg chg="addSp delSp modSp mod setBg">
-        <pc:chgData name="Md Kauser Ahmmed" userId="81e39d19-8d5c-4ffe-9a82-20799efac8e0" providerId="ADAL" clId="{3A55CCAE-749B-4817-8638-97B22656D31F}" dt="2020-09-18T15:33:54.208" v="753" actId="20577"/>
-        <pc:sldMkLst>
-          <pc:docMk/>
-          <pc:sldMk cId="2100237636" sldId="291"/>
-        </pc:sldMkLst>
-        <pc:spChg chg="mod">
-          <ac:chgData name="Md Kauser Ahmmed" userId="81e39d19-8d5c-4ffe-9a82-20799efac8e0" providerId="ADAL" clId="{3A55CCAE-749B-4817-8638-97B22656D31F}" dt="2020-09-18T15:33:54.208" v="753" actId="20577"/>
-          <ac:spMkLst>
-            <pc:docMk/>
-            <pc:sldMk cId="2100237636" sldId="291"/>
-            <ac:spMk id="2" creationId="{0F4F13B2-30BC-4B0B-A741-8B8608768A7A}"/>
-          </ac:spMkLst>
-        </pc:spChg>
-        <pc:spChg chg="add del mod">
-          <ac:chgData name="Md Kauser Ahmmed" userId="81e39d19-8d5c-4ffe-9a82-20799efac8e0" providerId="ADAL" clId="{3A55CCAE-749B-4817-8638-97B22656D31F}" dt="2020-09-18T15:32:10.063" v="682"/>
-          <ac:spMkLst>
-            <pc:docMk/>
-            <pc:sldMk cId="2100237636" sldId="291"/>
-            <ac:spMk id="4" creationId="{874B8331-545D-47C9-A842-E38A0D56197F}"/>
-          </ac:spMkLst>
-        </pc:spChg>
-        <pc:spChg chg="add del mod">
-          <ac:chgData name="Md Kauser Ahmmed" userId="81e39d19-8d5c-4ffe-9a82-20799efac8e0" providerId="ADAL" clId="{3A55CCAE-749B-4817-8638-97B22656D31F}" dt="2020-09-18T15:33:41.324" v="724" actId="931"/>
-          <ac:spMkLst>
-            <pc:docMk/>
-            <pc:sldMk cId="2100237636" sldId="291"/>
-            <ac:spMk id="8" creationId="{9FF7B78C-1554-4832-AA4D-76FAE062389E}"/>
-          </ac:spMkLst>
-        </pc:spChg>
-        <pc:spChg chg="add">
-          <ac:chgData name="Md Kauser Ahmmed" userId="81e39d19-8d5c-4ffe-9a82-20799efac8e0" providerId="ADAL" clId="{3A55CCAE-749B-4817-8638-97B22656D31F}" dt="2020-09-18T15:32:14.841" v="685" actId="26606"/>
-          <ac:spMkLst>
-            <pc:docMk/>
-            <pc:sldMk cId="2100237636" sldId="291"/>
-            <ac:spMk id="11" creationId="{53F29798-D584-4792-9B62-3F5F5C36D619}"/>
-          </ac:spMkLst>
-        </pc:spChg>
-        <pc:picChg chg="add del mod">
-          <ac:chgData name="Md Kauser Ahmmed" userId="81e39d19-8d5c-4ffe-9a82-20799efac8e0" providerId="ADAL" clId="{3A55CCAE-749B-4817-8638-97B22656D31F}" dt="2020-09-18T15:33:08.358" v="723" actId="478"/>
-          <ac:picMkLst>
-            <pc:docMk/>
-            <pc:sldMk cId="2100237636" sldId="291"/>
-            <ac:picMk id="6" creationId="{D00D91F7-03FF-4F52-B813-E8E5895C2E39}"/>
-          </ac:picMkLst>
-        </pc:picChg>
-        <pc:picChg chg="del">
-          <ac:chgData name="Md Kauser Ahmmed" userId="81e39d19-8d5c-4ffe-9a82-20799efac8e0" providerId="ADAL" clId="{3A55CCAE-749B-4817-8638-97B22656D31F}" dt="2020-09-18T15:32:08.486" v="681" actId="478"/>
-          <ac:picMkLst>
-            <pc:docMk/>
-            <pc:sldMk cId="2100237636" sldId="291"/>
-            <ac:picMk id="9" creationId="{BD83E123-E490-4504-8B6F-49AF8BFFF182}"/>
-          </ac:picMkLst>
-        </pc:picChg>
-        <pc:picChg chg="add mod">
-          <ac:chgData name="Md Kauser Ahmmed" userId="81e39d19-8d5c-4ffe-9a82-20799efac8e0" providerId="ADAL" clId="{3A55CCAE-749B-4817-8638-97B22656D31F}" dt="2020-09-18T15:33:42.821" v="726" actId="962"/>
-          <ac:picMkLst>
-            <pc:docMk/>
-            <pc:sldMk cId="2100237636" sldId="291"/>
-            <ac:picMk id="12" creationId="{A5D262B8-D0EB-40AE-A7E4-B47F2EC0997E}"/>
-          </ac:picMkLst>
-        </pc:picChg>
-      </pc:sldChg>
-      <pc:sldChg chg="del">
-        <pc:chgData name="Md Kauser Ahmmed" userId="81e39d19-8d5c-4ffe-9a82-20799efac8e0" providerId="ADAL" clId="{3A55CCAE-749B-4817-8638-97B22656D31F}" dt="2020-09-18T15:34:41.338" v="759" actId="2696"/>
-        <pc:sldMkLst>
-          <pc:docMk/>
-          <pc:sldMk cId="126425521" sldId="292"/>
-        </pc:sldMkLst>
-      </pc:sldChg>
-      <pc:sldChg chg="modSp add">
-        <pc:chgData name="Md Kauser Ahmmed" userId="81e39d19-8d5c-4ffe-9a82-20799efac8e0" providerId="ADAL" clId="{3A55CCAE-749B-4817-8638-97B22656D31F}" dt="2020-09-17T22:43:35.352" v="292" actId="20577"/>
-        <pc:sldMkLst>
-          <pc:docMk/>
-          <pc:sldMk cId="2643112249" sldId="293"/>
-        </pc:sldMkLst>
-        <pc:spChg chg="mod">
-          <ac:chgData name="Md Kauser Ahmmed" userId="81e39d19-8d5c-4ffe-9a82-20799efac8e0" providerId="ADAL" clId="{3A55CCAE-749B-4817-8638-97B22656D31F}" dt="2020-09-17T22:41:49.872" v="225" actId="20577"/>
-          <ac:spMkLst>
-            <pc:docMk/>
-            <pc:sldMk cId="2643112249" sldId="293"/>
-            <ac:spMk id="2" creationId="{C604CE27-EB50-4E58-AD2A-80973442D814}"/>
-          </ac:spMkLst>
-        </pc:spChg>
-        <pc:spChg chg="mod">
-          <ac:chgData name="Md Kauser Ahmmed" userId="81e39d19-8d5c-4ffe-9a82-20799efac8e0" providerId="ADAL" clId="{3A55CCAE-749B-4817-8638-97B22656D31F}" dt="2020-09-17T22:43:35.352" v="292" actId="20577"/>
-          <ac:spMkLst>
-            <pc:docMk/>
-            <pc:sldMk cId="2643112249" sldId="293"/>
-            <ac:spMk id="3" creationId="{6C58F653-65FA-4EAC-8F96-BB20CE60DAB0}"/>
-          </ac:spMkLst>
-        </pc:spChg>
-      </pc:sldChg>
-      <pc:sldChg chg="modSp add">
-        <pc:chgData name="Md Kauser Ahmmed" userId="81e39d19-8d5c-4ffe-9a82-20799efac8e0" providerId="ADAL" clId="{3A55CCAE-749B-4817-8638-97B22656D31F}" dt="2020-09-17T23:11:13.067" v="480" actId="20577"/>
-        <pc:sldMkLst>
-          <pc:docMk/>
-          <pc:sldMk cId="3806874064" sldId="294"/>
-        </pc:sldMkLst>
-        <pc:spChg chg="mod">
-          <ac:chgData name="Md Kauser Ahmmed" userId="81e39d19-8d5c-4ffe-9a82-20799efac8e0" providerId="ADAL" clId="{3A55CCAE-749B-4817-8638-97B22656D31F}" dt="2020-09-17T22:44:36.420" v="304" actId="20577"/>
-          <ac:spMkLst>
-            <pc:docMk/>
-            <pc:sldMk cId="3806874064" sldId="294"/>
-            <ac:spMk id="2" creationId="{41128F7E-AD1A-44EE-8E4F-107CA1BB7B58}"/>
-          </ac:spMkLst>
-        </pc:spChg>
-        <pc:spChg chg="mod">
-          <ac:chgData name="Md Kauser Ahmmed" userId="81e39d19-8d5c-4ffe-9a82-20799efac8e0" providerId="ADAL" clId="{3A55CCAE-749B-4817-8638-97B22656D31F}" dt="2020-09-17T23:11:13.067" v="480" actId="20577"/>
-          <ac:spMkLst>
-            <pc:docMk/>
-            <pc:sldMk cId="3806874064" sldId="294"/>
-            <ac:spMk id="3" creationId="{066E0E3E-8117-4A7C-895F-0A6C647DAA69}"/>
-          </ac:spMkLst>
-        </pc:spChg>
-      </pc:sldChg>
-      <pc:sldChg chg="addSp delSp modSp add">
-        <pc:chgData name="Md Kauser Ahmmed" userId="81e39d19-8d5c-4ffe-9a82-20799efac8e0" providerId="ADAL" clId="{3A55CCAE-749B-4817-8638-97B22656D31F}" dt="2020-09-18T15:38:14.367" v="864" actId="14100"/>
-        <pc:sldMkLst>
-          <pc:docMk/>
-          <pc:sldMk cId="1513331418" sldId="295"/>
-        </pc:sldMkLst>
-        <pc:spChg chg="mod">
-          <ac:chgData name="Md Kauser Ahmmed" userId="81e39d19-8d5c-4ffe-9a82-20799efac8e0" providerId="ADAL" clId="{3A55CCAE-749B-4817-8638-97B22656D31F}" dt="2020-09-18T15:37:49.045" v="862"/>
-          <ac:spMkLst>
-            <pc:docMk/>
-            <pc:sldMk cId="1513331418" sldId="295"/>
-            <ac:spMk id="2" creationId="{2EF97407-E221-4D0C-AEAF-23BC537FFDEE}"/>
-          </ac:spMkLst>
-        </pc:spChg>
-        <pc:spChg chg="del">
-          <ac:chgData name="Md Kauser Ahmmed" userId="81e39d19-8d5c-4ffe-9a82-20799efac8e0" providerId="ADAL" clId="{3A55CCAE-749B-4817-8638-97B22656D31F}" dt="2020-09-18T15:35:38.804" v="761" actId="931"/>
-          <ac:spMkLst>
-            <pc:docMk/>
-            <pc:sldMk cId="1513331418" sldId="295"/>
-            <ac:spMk id="3" creationId="{D3504309-BDF0-477B-A922-28456F92423F}"/>
-          </ac:spMkLst>
-        </pc:spChg>
-        <pc:picChg chg="add mod">
-          <ac:chgData name="Md Kauser Ahmmed" userId="81e39d19-8d5c-4ffe-9a82-20799efac8e0" providerId="ADAL" clId="{3A55CCAE-749B-4817-8638-97B22656D31F}" dt="2020-09-18T15:38:14.367" v="864" actId="14100"/>
-          <ac:picMkLst>
-            <pc:docMk/>
-            <pc:sldMk cId="1513331418" sldId="295"/>
-            <ac:picMk id="5" creationId="{F818A7FC-2579-4B83-9156-CD14163F6347}"/>
-          </ac:picMkLst>
-        </pc:picChg>
-      </pc:sldChg>
-      <pc:sldChg chg="addSp delSp modSp add mod setBg">
-        <pc:chgData name="Md Kauser Ahmmed" userId="81e39d19-8d5c-4ffe-9a82-20799efac8e0" providerId="ADAL" clId="{3A55CCAE-749B-4817-8638-97B22656D31F}" dt="2020-09-18T15:37:33.826" v="861" actId="26606"/>
-        <pc:sldMkLst>
-          <pc:docMk/>
-          <pc:sldMk cId="3201184893" sldId="296"/>
-        </pc:sldMkLst>
-        <pc:spChg chg="mod">
-          <ac:chgData name="Md Kauser Ahmmed" userId="81e39d19-8d5c-4ffe-9a82-20799efac8e0" providerId="ADAL" clId="{3A55CCAE-749B-4817-8638-97B22656D31F}" dt="2020-09-18T15:37:33.826" v="861" actId="26606"/>
-          <ac:spMkLst>
-            <pc:docMk/>
-            <pc:sldMk cId="3201184893" sldId="296"/>
-            <ac:spMk id="2" creationId="{4679E3EB-9298-4B04-B41B-9657247CEEAA}"/>
-          </ac:spMkLst>
-        </pc:spChg>
-        <pc:spChg chg="del">
-          <ac:chgData name="Md Kauser Ahmmed" userId="81e39d19-8d5c-4ffe-9a82-20799efac8e0" providerId="ADAL" clId="{3A55CCAE-749B-4817-8638-97B22656D31F}" dt="2020-09-18T15:37:11.320" v="817" actId="931"/>
-          <ac:spMkLst>
-            <pc:docMk/>
-            <pc:sldMk cId="3201184893" sldId="296"/>
-            <ac:spMk id="3" creationId="{7589C1DA-0C10-4C65-8E97-C4A859CB86E2}"/>
-          </ac:spMkLst>
-        </pc:spChg>
-        <pc:spChg chg="add">
-          <ac:chgData name="Md Kauser Ahmmed" userId="81e39d19-8d5c-4ffe-9a82-20799efac8e0" providerId="ADAL" clId="{3A55CCAE-749B-4817-8638-97B22656D31F}" dt="2020-09-18T15:37:33.826" v="861" actId="26606"/>
-          <ac:spMkLst>
-            <pc:docMk/>
-            <pc:sldMk cId="3201184893" sldId="296"/>
-            <ac:spMk id="10" creationId="{53F29798-D584-4792-9B62-3F5F5C36D619}"/>
-          </ac:spMkLst>
-        </pc:spChg>
-        <pc:picChg chg="add mod">
-          <ac:chgData name="Md Kauser Ahmmed" userId="81e39d19-8d5c-4ffe-9a82-20799efac8e0" providerId="ADAL" clId="{3A55CCAE-749B-4817-8638-97B22656D31F}" dt="2020-09-18T15:37:33.826" v="861" actId="26606"/>
-          <ac:picMkLst>
-            <pc:docMk/>
-            <pc:sldMk cId="3201184893" sldId="296"/>
-            <ac:picMk id="5" creationId="{CA27098A-4165-4A86-A743-724745552C59}"/>
-          </ac:picMkLst>
-        </pc:picChg>
-      </pc:sldChg>
-      <pc:sldChg chg="addSp delSp modSp add ord">
-        <pc:chgData name="Md Kauser Ahmmed" userId="81e39d19-8d5c-4ffe-9a82-20799efac8e0" providerId="ADAL" clId="{3A55CCAE-749B-4817-8638-97B22656D31F}" dt="2020-09-18T15:40:09.415" v="921" actId="14100"/>
-        <pc:sldMkLst>
-          <pc:docMk/>
-          <pc:sldMk cId="3807525662" sldId="297"/>
-        </pc:sldMkLst>
-        <pc:spChg chg="mod">
-          <ac:chgData name="Md Kauser Ahmmed" userId="81e39d19-8d5c-4ffe-9a82-20799efac8e0" providerId="ADAL" clId="{3A55CCAE-749B-4817-8638-97B22656D31F}" dt="2020-09-18T15:38:59.509" v="914" actId="20577"/>
-          <ac:spMkLst>
-            <pc:docMk/>
-            <pc:sldMk cId="3807525662" sldId="297"/>
-            <ac:spMk id="2" creationId="{9E230CAA-F5A8-4858-BB51-764A66846420}"/>
-          </ac:spMkLst>
-        </pc:spChg>
-        <pc:spChg chg="del">
-          <ac:chgData name="Md Kauser Ahmmed" userId="81e39d19-8d5c-4ffe-9a82-20799efac8e0" providerId="ADAL" clId="{3A55CCAE-749B-4817-8638-97B22656D31F}" dt="2020-09-18T15:39:10.387" v="915" actId="931"/>
-          <ac:spMkLst>
-            <pc:docMk/>
-            <pc:sldMk cId="3807525662" sldId="297"/>
-            <ac:spMk id="3" creationId="{5A4F9894-CC31-40D4-95A8-ABD2016806F8}"/>
-          </ac:spMkLst>
-        </pc:spChg>
-        <pc:picChg chg="add mod">
-          <ac:chgData name="Md Kauser Ahmmed" userId="81e39d19-8d5c-4ffe-9a82-20799efac8e0" providerId="ADAL" clId="{3A55CCAE-749B-4817-8638-97B22656D31F}" dt="2020-09-18T15:40:09.415" v="921" actId="14100"/>
-          <ac:picMkLst>
-            <pc:docMk/>
-            <pc:sldMk cId="3807525662" sldId="297"/>
-            <ac:picMk id="5" creationId="{3E033F69-515D-48CA-A337-C51DA942D87F}"/>
-          </ac:picMkLst>
-        </pc:picChg>
-      </pc:sldChg>
-      <pc:sldChg chg="addSp delSp modSp add">
-        <pc:chgData name="Md Kauser Ahmmed" userId="81e39d19-8d5c-4ffe-9a82-20799efac8e0" providerId="ADAL" clId="{3A55CCAE-749B-4817-8638-97B22656D31F}" dt="2020-09-18T15:41:32.007" v="927" actId="14100"/>
-        <pc:sldMkLst>
-          <pc:docMk/>
-          <pc:sldMk cId="705476752" sldId="298"/>
-        </pc:sldMkLst>
-        <pc:spChg chg="mod">
-          <ac:chgData name="Md Kauser Ahmmed" userId="81e39d19-8d5c-4ffe-9a82-20799efac8e0" providerId="ADAL" clId="{3A55CCAE-749B-4817-8638-97B22656D31F}" dt="2020-09-18T15:39:58.812" v="920"/>
-          <ac:spMkLst>
-            <pc:docMk/>
-            <pc:sldMk cId="705476752" sldId="298"/>
-            <ac:spMk id="2" creationId="{6883D339-FDDE-4E8E-B654-A4D896D93106}"/>
-          </ac:spMkLst>
-        </pc:spChg>
-        <pc:spChg chg="add del">
-          <ac:chgData name="Md Kauser Ahmmed" userId="81e39d19-8d5c-4ffe-9a82-20799efac8e0" providerId="ADAL" clId="{3A55CCAE-749B-4817-8638-97B22656D31F}" dt="2020-09-18T15:40:55.751" v="924" actId="931"/>
-          <ac:spMkLst>
-            <pc:docMk/>
-            <pc:sldMk cId="705476752" sldId="298"/>
-            <ac:spMk id="3" creationId="{D0852596-C9B0-4CA4-8B57-52A2D2058BE8}"/>
-          </ac:spMkLst>
-        </pc:spChg>
-        <pc:picChg chg="add del mod">
-          <ac:chgData name="Md Kauser Ahmmed" userId="81e39d19-8d5c-4ffe-9a82-20799efac8e0" providerId="ADAL" clId="{3A55CCAE-749B-4817-8638-97B22656D31F}" dt="2020-09-18T15:40:51.006" v="923" actId="931"/>
-          <ac:picMkLst>
-            <pc:docMk/>
-            <pc:sldMk cId="705476752" sldId="298"/>
-            <ac:picMk id="5" creationId="{F3D5934A-936B-4B96-A866-A5B1B6329379}"/>
-          </ac:picMkLst>
-        </pc:picChg>
-        <pc:picChg chg="add mod">
-          <ac:chgData name="Md Kauser Ahmmed" userId="81e39d19-8d5c-4ffe-9a82-20799efac8e0" providerId="ADAL" clId="{3A55CCAE-749B-4817-8638-97B22656D31F}" dt="2020-09-18T15:41:32.007" v="927" actId="14100"/>
-          <ac:picMkLst>
-            <pc:docMk/>
-            <pc:sldMk cId="705476752" sldId="298"/>
-            <ac:picMk id="7" creationId="{302750BE-E081-45B3-9336-07BB22507ECB}"/>
-          </ac:picMkLst>
-        </pc:picChg>
-      </pc:sldChg>
-      <pc:sldChg chg="addSp delSp modSp add mod setBg">
-        <pc:chgData name="Md Kauser Ahmmed" userId="81e39d19-8d5c-4ffe-9a82-20799efac8e0" providerId="ADAL" clId="{3A55CCAE-749B-4817-8638-97B22656D31F}" dt="2020-09-18T16:30:40.735" v="940" actId="20577"/>
-        <pc:sldMkLst>
-          <pc:docMk/>
-          <pc:sldMk cId="2179309757" sldId="299"/>
-        </pc:sldMkLst>
-        <pc:spChg chg="mod">
-          <ac:chgData name="Md Kauser Ahmmed" userId="81e39d19-8d5c-4ffe-9a82-20799efac8e0" providerId="ADAL" clId="{3A55CCAE-749B-4817-8638-97B22656D31F}" dt="2020-09-18T16:30:40.735" v="940" actId="20577"/>
-          <ac:spMkLst>
-            <pc:docMk/>
-            <pc:sldMk cId="2179309757" sldId="299"/>
-            <ac:spMk id="2" creationId="{284849D0-B00B-41F8-A8DC-CF09038960BF}"/>
-          </ac:spMkLst>
-        </pc:spChg>
-        <pc:spChg chg="del">
-          <ac:chgData name="Md Kauser Ahmmed" userId="81e39d19-8d5c-4ffe-9a82-20799efac8e0" providerId="ADAL" clId="{3A55CCAE-749B-4817-8638-97B22656D31F}" dt="2020-09-18T16:30:27.228" v="936"/>
-          <ac:spMkLst>
-            <pc:docMk/>
-            <pc:sldMk cId="2179309757" sldId="299"/>
-            <ac:spMk id="3" creationId="{7AF86B43-08EF-4209-AA89-C3DBA6DF7637}"/>
-          </ac:spMkLst>
-        </pc:spChg>
-        <pc:spChg chg="add">
-          <ac:chgData name="Md Kauser Ahmmed" userId="81e39d19-8d5c-4ffe-9a82-20799efac8e0" providerId="ADAL" clId="{3A55CCAE-749B-4817-8638-97B22656D31F}" dt="2020-09-18T16:30:30.922" v="937" actId="26606"/>
-          <ac:spMkLst>
-            <pc:docMk/>
-            <pc:sldMk cId="2179309757" sldId="299"/>
-            <ac:spMk id="9" creationId="{53F29798-D584-4792-9B62-3F5F5C36D619}"/>
-          </ac:spMkLst>
-        </pc:spChg>
-        <pc:graphicFrameChg chg="add mod modGraphic">
-          <ac:chgData name="Md Kauser Ahmmed" userId="81e39d19-8d5c-4ffe-9a82-20799efac8e0" providerId="ADAL" clId="{3A55CCAE-749B-4817-8638-97B22656D31F}" dt="2020-09-18T16:30:30.922" v="937" actId="26606"/>
-          <ac:graphicFrameMkLst>
-            <pc:docMk/>
-            <pc:sldMk cId="2179309757" sldId="299"/>
-            <ac:graphicFrameMk id="4" creationId="{C11BA0E5-C2A0-48A5-A877-2B6C33792D4F}"/>
-          </ac:graphicFrameMkLst>
-        </pc:graphicFrameChg>
-      </pc:sldChg>
-    </pc:docChg>
-  </pc:docChgLst>
   <pc:docChgLst>
     <pc:chgData name="Md Kauser Ahmmed" userId="81e39d19-8d5c-4ffe-9a82-20799efac8e0" providerId="ADAL" clId="{5C14BA9A-C8CE-4A78-B23A-75368C2A47D9}"/>
     <pc:docChg chg="undo custSel mod addSld delSld modSld sldOrd">
@@ -1217,6 +814,633 @@
     </pc:docChg>
   </pc:docChgLst>
   <pc:docChgLst>
+    <pc:chgData name="Md Kauser Ahmmed" userId="81e39d19-8d5c-4ffe-9a82-20799efac8e0" providerId="ADAL" clId="{3A55CCAE-749B-4817-8638-97B22656D31F}"/>
+    <pc:docChg chg="undo custSel mod addSld delSld modSld sldOrd">
+      <pc:chgData name="Md Kauser Ahmmed" userId="81e39d19-8d5c-4ffe-9a82-20799efac8e0" providerId="ADAL" clId="{3A55CCAE-749B-4817-8638-97B22656D31F}" dt="2020-09-18T17:29:01.843" v="942" actId="20577"/>
+      <pc:docMkLst>
+        <pc:docMk/>
+      </pc:docMkLst>
+      <pc:sldChg chg="modSp">
+        <pc:chgData name="Md Kauser Ahmmed" userId="81e39d19-8d5c-4ffe-9a82-20799efac8e0" providerId="ADAL" clId="{3A55CCAE-749B-4817-8638-97B22656D31F}" dt="2020-09-18T15:29:41.932" v="631" actId="20577"/>
+        <pc:sldMkLst>
+          <pc:docMk/>
+          <pc:sldMk cId="1659930921" sldId="256"/>
+        </pc:sldMkLst>
+        <pc:spChg chg="mod">
+          <ac:chgData name="Md Kauser Ahmmed" userId="81e39d19-8d5c-4ffe-9a82-20799efac8e0" providerId="ADAL" clId="{3A55CCAE-749B-4817-8638-97B22656D31F}" dt="2020-09-18T15:29:41.932" v="631" actId="20577"/>
+          <ac:spMkLst>
+            <pc:docMk/>
+            <pc:sldMk cId="1659930921" sldId="256"/>
+            <ac:spMk id="6" creationId="{1EEBDA52-BE46-433D-AB6E-4D2949F916FF}"/>
+          </ac:spMkLst>
+        </pc:spChg>
+      </pc:sldChg>
+      <pc:sldChg chg="addSp delSp modSp">
+        <pc:chgData name="Md Kauser Ahmmed" userId="81e39d19-8d5c-4ffe-9a82-20799efac8e0" providerId="ADAL" clId="{3A55CCAE-749B-4817-8638-97B22656D31F}" dt="2020-09-18T15:34:16.966" v="758" actId="26606"/>
+        <pc:sldMkLst>
+          <pc:docMk/>
+          <pc:sldMk cId="4056875156" sldId="259"/>
+        </pc:sldMkLst>
+        <pc:spChg chg="mod">
+          <ac:chgData name="Md Kauser Ahmmed" userId="81e39d19-8d5c-4ffe-9a82-20799efac8e0" providerId="ADAL" clId="{3A55CCAE-749B-4817-8638-97B22656D31F}" dt="2020-09-18T15:34:16.966" v="758" actId="26606"/>
+          <ac:spMkLst>
+            <pc:docMk/>
+            <pc:sldMk cId="4056875156" sldId="259"/>
+            <ac:spMk id="2" creationId="{45F2AC63-EFDA-4E7C-A71C-7D3EE46A34E8}"/>
+          </ac:spMkLst>
+        </pc:spChg>
+        <pc:spChg chg="del">
+          <ac:chgData name="Md Kauser Ahmmed" userId="81e39d19-8d5c-4ffe-9a82-20799efac8e0" providerId="ADAL" clId="{3A55CCAE-749B-4817-8638-97B22656D31F}" dt="2020-09-18T15:34:16.966" v="758" actId="26606"/>
+          <ac:spMkLst>
+            <pc:docMk/>
+            <pc:sldMk cId="4056875156" sldId="259"/>
+            <ac:spMk id="26" creationId="{53F29798-D584-4792-9B62-3F5F5C36D619}"/>
+          </ac:spMkLst>
+        </pc:spChg>
+        <pc:spChg chg="add">
+          <ac:chgData name="Md Kauser Ahmmed" userId="81e39d19-8d5c-4ffe-9a82-20799efac8e0" providerId="ADAL" clId="{3A55CCAE-749B-4817-8638-97B22656D31F}" dt="2020-09-18T15:34:16.966" v="758" actId="26606"/>
+          <ac:spMkLst>
+            <pc:docMk/>
+            <pc:sldMk cId="4056875156" sldId="259"/>
+            <ac:spMk id="31" creationId="{53F29798-D584-4792-9B62-3F5F5C36D619}"/>
+          </ac:spMkLst>
+        </pc:spChg>
+        <pc:picChg chg="add mod">
+          <ac:chgData name="Md Kauser Ahmmed" userId="81e39d19-8d5c-4ffe-9a82-20799efac8e0" providerId="ADAL" clId="{3A55CCAE-749B-4817-8638-97B22656D31F}" dt="2020-09-18T15:34:16.966" v="758" actId="26606"/>
+          <ac:picMkLst>
+            <pc:docMk/>
+            <pc:sldMk cId="4056875156" sldId="259"/>
+            <ac:picMk id="4" creationId="{6751950B-22EC-40E1-A4ED-E4FEC7C2E08A}"/>
+          </ac:picMkLst>
+        </pc:picChg>
+        <pc:picChg chg="del">
+          <ac:chgData name="Md Kauser Ahmmed" userId="81e39d19-8d5c-4ffe-9a82-20799efac8e0" providerId="ADAL" clId="{3A55CCAE-749B-4817-8638-97B22656D31F}" dt="2020-09-18T15:31:08.905" v="632" actId="478"/>
+          <ac:picMkLst>
+            <pc:docMk/>
+            <pc:sldMk cId="4056875156" sldId="259"/>
+            <ac:picMk id="8" creationId="{56610AC1-0979-421C-8184-70A320D5905D}"/>
+          </ac:picMkLst>
+        </pc:picChg>
+      </pc:sldChg>
+      <pc:sldChg chg="modSp">
+        <pc:chgData name="Md Kauser Ahmmed" userId="81e39d19-8d5c-4ffe-9a82-20799efac8e0" providerId="ADAL" clId="{3A55CCAE-749B-4817-8638-97B22656D31F}" dt="2020-09-18T17:29:01.843" v="942" actId="20577"/>
+        <pc:sldMkLst>
+          <pc:docMk/>
+          <pc:sldMk cId="1010047731" sldId="271"/>
+        </pc:sldMkLst>
+        <pc:spChg chg="mod">
+          <ac:chgData name="Md Kauser Ahmmed" userId="81e39d19-8d5c-4ffe-9a82-20799efac8e0" providerId="ADAL" clId="{3A55CCAE-749B-4817-8638-97B22656D31F}" dt="2020-09-18T17:29:01.843" v="942" actId="20577"/>
+          <ac:spMkLst>
+            <pc:docMk/>
+            <pc:sldMk cId="1010047731" sldId="271"/>
+            <ac:spMk id="3" creationId="{771893B1-979C-4E59-951A-F29EB496A9C1}"/>
+          </ac:spMkLst>
+        </pc:spChg>
+      </pc:sldChg>
+      <pc:sldChg chg="modSp">
+        <pc:chgData name="Md Kauser Ahmmed" userId="81e39d19-8d5c-4ffe-9a82-20799efac8e0" providerId="ADAL" clId="{3A55CCAE-749B-4817-8638-97B22656D31F}" dt="2020-09-17T21:36:16.253" v="137" actId="207"/>
+        <pc:sldMkLst>
+          <pc:docMk/>
+          <pc:sldMk cId="1493241202" sldId="289"/>
+        </pc:sldMkLst>
+        <pc:spChg chg="mod">
+          <ac:chgData name="Md Kauser Ahmmed" userId="81e39d19-8d5c-4ffe-9a82-20799efac8e0" providerId="ADAL" clId="{3A55CCAE-749B-4817-8638-97B22656D31F}" dt="2020-09-17T21:36:16.253" v="137" actId="207"/>
+          <ac:spMkLst>
+            <pc:docMk/>
+            <pc:sldMk cId="1493241202" sldId="289"/>
+            <ac:spMk id="3" creationId="{FAF7EFD8-937E-4485-A5BE-D7EBC0477783}"/>
+          </ac:spMkLst>
+        </pc:spChg>
+      </pc:sldChg>
+      <pc:sldChg chg="modSp">
+        <pc:chgData name="Md Kauser Ahmmed" userId="81e39d19-8d5c-4ffe-9a82-20799efac8e0" providerId="ADAL" clId="{3A55CCAE-749B-4817-8638-97B22656D31F}" dt="2020-09-17T21:37:05.602" v="141" actId="207"/>
+        <pc:sldMkLst>
+          <pc:docMk/>
+          <pc:sldMk cId="3625187802" sldId="290"/>
+        </pc:sldMkLst>
+        <pc:spChg chg="mod">
+          <ac:chgData name="Md Kauser Ahmmed" userId="81e39d19-8d5c-4ffe-9a82-20799efac8e0" providerId="ADAL" clId="{3A55CCAE-749B-4817-8638-97B22656D31F}" dt="2020-09-17T21:37:05.602" v="141" actId="207"/>
+          <ac:spMkLst>
+            <pc:docMk/>
+            <pc:sldMk cId="3625187802" sldId="290"/>
+            <ac:spMk id="3" creationId="{64F80B61-502D-47EC-86FD-28DA3D65A610}"/>
+          </ac:spMkLst>
+        </pc:spChg>
+      </pc:sldChg>
+      <pc:sldChg chg="addSp delSp modSp mod setBg">
+        <pc:chgData name="Md Kauser Ahmmed" userId="81e39d19-8d5c-4ffe-9a82-20799efac8e0" providerId="ADAL" clId="{3A55CCAE-749B-4817-8638-97B22656D31F}" dt="2020-09-18T15:33:54.208" v="753" actId="20577"/>
+        <pc:sldMkLst>
+          <pc:docMk/>
+          <pc:sldMk cId="2100237636" sldId="291"/>
+        </pc:sldMkLst>
+        <pc:spChg chg="mod">
+          <ac:chgData name="Md Kauser Ahmmed" userId="81e39d19-8d5c-4ffe-9a82-20799efac8e0" providerId="ADAL" clId="{3A55CCAE-749B-4817-8638-97B22656D31F}" dt="2020-09-18T15:33:54.208" v="753" actId="20577"/>
+          <ac:spMkLst>
+            <pc:docMk/>
+            <pc:sldMk cId="2100237636" sldId="291"/>
+            <ac:spMk id="2" creationId="{0F4F13B2-30BC-4B0B-A741-8B8608768A7A}"/>
+          </ac:spMkLst>
+        </pc:spChg>
+        <pc:spChg chg="add del mod">
+          <ac:chgData name="Md Kauser Ahmmed" userId="81e39d19-8d5c-4ffe-9a82-20799efac8e0" providerId="ADAL" clId="{3A55CCAE-749B-4817-8638-97B22656D31F}" dt="2020-09-18T15:32:10.063" v="682"/>
+          <ac:spMkLst>
+            <pc:docMk/>
+            <pc:sldMk cId="2100237636" sldId="291"/>
+            <ac:spMk id="4" creationId="{874B8331-545D-47C9-A842-E38A0D56197F}"/>
+          </ac:spMkLst>
+        </pc:spChg>
+        <pc:spChg chg="add del mod">
+          <ac:chgData name="Md Kauser Ahmmed" userId="81e39d19-8d5c-4ffe-9a82-20799efac8e0" providerId="ADAL" clId="{3A55CCAE-749B-4817-8638-97B22656D31F}" dt="2020-09-18T15:33:41.324" v="724" actId="931"/>
+          <ac:spMkLst>
+            <pc:docMk/>
+            <pc:sldMk cId="2100237636" sldId="291"/>
+            <ac:spMk id="8" creationId="{9FF7B78C-1554-4832-AA4D-76FAE062389E}"/>
+          </ac:spMkLst>
+        </pc:spChg>
+        <pc:spChg chg="add">
+          <ac:chgData name="Md Kauser Ahmmed" userId="81e39d19-8d5c-4ffe-9a82-20799efac8e0" providerId="ADAL" clId="{3A55CCAE-749B-4817-8638-97B22656D31F}" dt="2020-09-18T15:32:14.841" v="685" actId="26606"/>
+          <ac:spMkLst>
+            <pc:docMk/>
+            <pc:sldMk cId="2100237636" sldId="291"/>
+            <ac:spMk id="11" creationId="{53F29798-D584-4792-9B62-3F5F5C36D619}"/>
+          </ac:spMkLst>
+        </pc:spChg>
+        <pc:picChg chg="add del mod">
+          <ac:chgData name="Md Kauser Ahmmed" userId="81e39d19-8d5c-4ffe-9a82-20799efac8e0" providerId="ADAL" clId="{3A55CCAE-749B-4817-8638-97B22656D31F}" dt="2020-09-18T15:33:08.358" v="723" actId="478"/>
+          <ac:picMkLst>
+            <pc:docMk/>
+            <pc:sldMk cId="2100237636" sldId="291"/>
+            <ac:picMk id="6" creationId="{D00D91F7-03FF-4F52-B813-E8E5895C2E39}"/>
+          </ac:picMkLst>
+        </pc:picChg>
+        <pc:picChg chg="del">
+          <ac:chgData name="Md Kauser Ahmmed" userId="81e39d19-8d5c-4ffe-9a82-20799efac8e0" providerId="ADAL" clId="{3A55CCAE-749B-4817-8638-97B22656D31F}" dt="2020-09-18T15:32:08.486" v="681" actId="478"/>
+          <ac:picMkLst>
+            <pc:docMk/>
+            <pc:sldMk cId="2100237636" sldId="291"/>
+            <ac:picMk id="9" creationId="{BD83E123-E490-4504-8B6F-49AF8BFFF182}"/>
+          </ac:picMkLst>
+        </pc:picChg>
+        <pc:picChg chg="add mod">
+          <ac:chgData name="Md Kauser Ahmmed" userId="81e39d19-8d5c-4ffe-9a82-20799efac8e0" providerId="ADAL" clId="{3A55CCAE-749B-4817-8638-97B22656D31F}" dt="2020-09-18T15:33:42.821" v="726" actId="962"/>
+          <ac:picMkLst>
+            <pc:docMk/>
+            <pc:sldMk cId="2100237636" sldId="291"/>
+            <ac:picMk id="12" creationId="{A5D262B8-D0EB-40AE-A7E4-B47F2EC0997E}"/>
+          </ac:picMkLst>
+        </pc:picChg>
+      </pc:sldChg>
+      <pc:sldChg chg="del">
+        <pc:chgData name="Md Kauser Ahmmed" userId="81e39d19-8d5c-4ffe-9a82-20799efac8e0" providerId="ADAL" clId="{3A55CCAE-749B-4817-8638-97B22656D31F}" dt="2020-09-18T15:34:41.338" v="759" actId="2696"/>
+        <pc:sldMkLst>
+          <pc:docMk/>
+          <pc:sldMk cId="126425521" sldId="292"/>
+        </pc:sldMkLst>
+      </pc:sldChg>
+      <pc:sldChg chg="modSp add">
+        <pc:chgData name="Md Kauser Ahmmed" userId="81e39d19-8d5c-4ffe-9a82-20799efac8e0" providerId="ADAL" clId="{3A55CCAE-749B-4817-8638-97B22656D31F}" dt="2020-09-17T22:43:35.352" v="292" actId="20577"/>
+        <pc:sldMkLst>
+          <pc:docMk/>
+          <pc:sldMk cId="2643112249" sldId="293"/>
+        </pc:sldMkLst>
+        <pc:spChg chg="mod">
+          <ac:chgData name="Md Kauser Ahmmed" userId="81e39d19-8d5c-4ffe-9a82-20799efac8e0" providerId="ADAL" clId="{3A55CCAE-749B-4817-8638-97B22656D31F}" dt="2020-09-17T22:41:49.872" v="225" actId="20577"/>
+          <ac:spMkLst>
+            <pc:docMk/>
+            <pc:sldMk cId="2643112249" sldId="293"/>
+            <ac:spMk id="2" creationId="{C604CE27-EB50-4E58-AD2A-80973442D814}"/>
+          </ac:spMkLst>
+        </pc:spChg>
+        <pc:spChg chg="mod">
+          <ac:chgData name="Md Kauser Ahmmed" userId="81e39d19-8d5c-4ffe-9a82-20799efac8e0" providerId="ADAL" clId="{3A55CCAE-749B-4817-8638-97B22656D31F}" dt="2020-09-17T22:43:35.352" v="292" actId="20577"/>
+          <ac:spMkLst>
+            <pc:docMk/>
+            <pc:sldMk cId="2643112249" sldId="293"/>
+            <ac:spMk id="3" creationId="{6C58F653-65FA-4EAC-8F96-BB20CE60DAB0}"/>
+          </ac:spMkLst>
+        </pc:spChg>
+      </pc:sldChg>
+      <pc:sldChg chg="modSp add">
+        <pc:chgData name="Md Kauser Ahmmed" userId="81e39d19-8d5c-4ffe-9a82-20799efac8e0" providerId="ADAL" clId="{3A55CCAE-749B-4817-8638-97B22656D31F}" dt="2020-09-17T23:11:13.067" v="480" actId="20577"/>
+        <pc:sldMkLst>
+          <pc:docMk/>
+          <pc:sldMk cId="3806874064" sldId="294"/>
+        </pc:sldMkLst>
+        <pc:spChg chg="mod">
+          <ac:chgData name="Md Kauser Ahmmed" userId="81e39d19-8d5c-4ffe-9a82-20799efac8e0" providerId="ADAL" clId="{3A55CCAE-749B-4817-8638-97B22656D31F}" dt="2020-09-17T22:44:36.420" v="304" actId="20577"/>
+          <ac:spMkLst>
+            <pc:docMk/>
+            <pc:sldMk cId="3806874064" sldId="294"/>
+            <ac:spMk id="2" creationId="{41128F7E-AD1A-44EE-8E4F-107CA1BB7B58}"/>
+          </ac:spMkLst>
+        </pc:spChg>
+        <pc:spChg chg="mod">
+          <ac:chgData name="Md Kauser Ahmmed" userId="81e39d19-8d5c-4ffe-9a82-20799efac8e0" providerId="ADAL" clId="{3A55CCAE-749B-4817-8638-97B22656D31F}" dt="2020-09-17T23:11:13.067" v="480" actId="20577"/>
+          <ac:spMkLst>
+            <pc:docMk/>
+            <pc:sldMk cId="3806874064" sldId="294"/>
+            <ac:spMk id="3" creationId="{066E0E3E-8117-4A7C-895F-0A6C647DAA69}"/>
+          </ac:spMkLst>
+        </pc:spChg>
+      </pc:sldChg>
+      <pc:sldChg chg="addSp delSp modSp add">
+        <pc:chgData name="Md Kauser Ahmmed" userId="81e39d19-8d5c-4ffe-9a82-20799efac8e0" providerId="ADAL" clId="{3A55CCAE-749B-4817-8638-97B22656D31F}" dt="2020-09-18T15:38:14.367" v="864" actId="14100"/>
+        <pc:sldMkLst>
+          <pc:docMk/>
+          <pc:sldMk cId="1513331418" sldId="295"/>
+        </pc:sldMkLst>
+        <pc:spChg chg="mod">
+          <ac:chgData name="Md Kauser Ahmmed" userId="81e39d19-8d5c-4ffe-9a82-20799efac8e0" providerId="ADAL" clId="{3A55CCAE-749B-4817-8638-97B22656D31F}" dt="2020-09-18T15:37:49.045" v="862"/>
+          <ac:spMkLst>
+            <pc:docMk/>
+            <pc:sldMk cId="1513331418" sldId="295"/>
+            <ac:spMk id="2" creationId="{2EF97407-E221-4D0C-AEAF-23BC537FFDEE}"/>
+          </ac:spMkLst>
+        </pc:spChg>
+        <pc:spChg chg="del">
+          <ac:chgData name="Md Kauser Ahmmed" userId="81e39d19-8d5c-4ffe-9a82-20799efac8e0" providerId="ADAL" clId="{3A55CCAE-749B-4817-8638-97B22656D31F}" dt="2020-09-18T15:35:38.804" v="761" actId="931"/>
+          <ac:spMkLst>
+            <pc:docMk/>
+            <pc:sldMk cId="1513331418" sldId="295"/>
+            <ac:spMk id="3" creationId="{D3504309-BDF0-477B-A922-28456F92423F}"/>
+          </ac:spMkLst>
+        </pc:spChg>
+        <pc:picChg chg="add mod">
+          <ac:chgData name="Md Kauser Ahmmed" userId="81e39d19-8d5c-4ffe-9a82-20799efac8e0" providerId="ADAL" clId="{3A55CCAE-749B-4817-8638-97B22656D31F}" dt="2020-09-18T15:38:14.367" v="864" actId="14100"/>
+          <ac:picMkLst>
+            <pc:docMk/>
+            <pc:sldMk cId="1513331418" sldId="295"/>
+            <ac:picMk id="5" creationId="{F818A7FC-2579-4B83-9156-CD14163F6347}"/>
+          </ac:picMkLst>
+        </pc:picChg>
+      </pc:sldChg>
+      <pc:sldChg chg="addSp delSp modSp add mod setBg">
+        <pc:chgData name="Md Kauser Ahmmed" userId="81e39d19-8d5c-4ffe-9a82-20799efac8e0" providerId="ADAL" clId="{3A55CCAE-749B-4817-8638-97B22656D31F}" dt="2020-09-18T15:37:33.826" v="861" actId="26606"/>
+        <pc:sldMkLst>
+          <pc:docMk/>
+          <pc:sldMk cId="3201184893" sldId="296"/>
+        </pc:sldMkLst>
+        <pc:spChg chg="mod">
+          <ac:chgData name="Md Kauser Ahmmed" userId="81e39d19-8d5c-4ffe-9a82-20799efac8e0" providerId="ADAL" clId="{3A55CCAE-749B-4817-8638-97B22656D31F}" dt="2020-09-18T15:37:33.826" v="861" actId="26606"/>
+          <ac:spMkLst>
+            <pc:docMk/>
+            <pc:sldMk cId="3201184893" sldId="296"/>
+            <ac:spMk id="2" creationId="{4679E3EB-9298-4B04-B41B-9657247CEEAA}"/>
+          </ac:spMkLst>
+        </pc:spChg>
+        <pc:spChg chg="del">
+          <ac:chgData name="Md Kauser Ahmmed" userId="81e39d19-8d5c-4ffe-9a82-20799efac8e0" providerId="ADAL" clId="{3A55CCAE-749B-4817-8638-97B22656D31F}" dt="2020-09-18T15:37:11.320" v="817" actId="931"/>
+          <ac:spMkLst>
+            <pc:docMk/>
+            <pc:sldMk cId="3201184893" sldId="296"/>
+            <ac:spMk id="3" creationId="{7589C1DA-0C10-4C65-8E97-C4A859CB86E2}"/>
+          </ac:spMkLst>
+        </pc:spChg>
+        <pc:spChg chg="add">
+          <ac:chgData name="Md Kauser Ahmmed" userId="81e39d19-8d5c-4ffe-9a82-20799efac8e0" providerId="ADAL" clId="{3A55CCAE-749B-4817-8638-97B22656D31F}" dt="2020-09-18T15:37:33.826" v="861" actId="26606"/>
+          <ac:spMkLst>
+            <pc:docMk/>
+            <pc:sldMk cId="3201184893" sldId="296"/>
+            <ac:spMk id="10" creationId="{53F29798-D584-4792-9B62-3F5F5C36D619}"/>
+          </ac:spMkLst>
+        </pc:spChg>
+        <pc:picChg chg="add mod">
+          <ac:chgData name="Md Kauser Ahmmed" userId="81e39d19-8d5c-4ffe-9a82-20799efac8e0" providerId="ADAL" clId="{3A55CCAE-749B-4817-8638-97B22656D31F}" dt="2020-09-18T15:37:33.826" v="861" actId="26606"/>
+          <ac:picMkLst>
+            <pc:docMk/>
+            <pc:sldMk cId="3201184893" sldId="296"/>
+            <ac:picMk id="5" creationId="{CA27098A-4165-4A86-A743-724745552C59}"/>
+          </ac:picMkLst>
+        </pc:picChg>
+      </pc:sldChg>
+      <pc:sldChg chg="addSp delSp modSp add ord">
+        <pc:chgData name="Md Kauser Ahmmed" userId="81e39d19-8d5c-4ffe-9a82-20799efac8e0" providerId="ADAL" clId="{3A55CCAE-749B-4817-8638-97B22656D31F}" dt="2020-09-18T15:40:09.415" v="921" actId="14100"/>
+        <pc:sldMkLst>
+          <pc:docMk/>
+          <pc:sldMk cId="3807525662" sldId="297"/>
+        </pc:sldMkLst>
+        <pc:spChg chg="mod">
+          <ac:chgData name="Md Kauser Ahmmed" userId="81e39d19-8d5c-4ffe-9a82-20799efac8e0" providerId="ADAL" clId="{3A55CCAE-749B-4817-8638-97B22656D31F}" dt="2020-09-18T15:38:59.509" v="914" actId="20577"/>
+          <ac:spMkLst>
+            <pc:docMk/>
+            <pc:sldMk cId="3807525662" sldId="297"/>
+            <ac:spMk id="2" creationId="{9E230CAA-F5A8-4858-BB51-764A66846420}"/>
+          </ac:spMkLst>
+        </pc:spChg>
+        <pc:spChg chg="del">
+          <ac:chgData name="Md Kauser Ahmmed" userId="81e39d19-8d5c-4ffe-9a82-20799efac8e0" providerId="ADAL" clId="{3A55CCAE-749B-4817-8638-97B22656D31F}" dt="2020-09-18T15:39:10.387" v="915" actId="931"/>
+          <ac:spMkLst>
+            <pc:docMk/>
+            <pc:sldMk cId="3807525662" sldId="297"/>
+            <ac:spMk id="3" creationId="{5A4F9894-CC31-40D4-95A8-ABD2016806F8}"/>
+          </ac:spMkLst>
+        </pc:spChg>
+        <pc:picChg chg="add mod">
+          <ac:chgData name="Md Kauser Ahmmed" userId="81e39d19-8d5c-4ffe-9a82-20799efac8e0" providerId="ADAL" clId="{3A55CCAE-749B-4817-8638-97B22656D31F}" dt="2020-09-18T15:40:09.415" v="921" actId="14100"/>
+          <ac:picMkLst>
+            <pc:docMk/>
+            <pc:sldMk cId="3807525662" sldId="297"/>
+            <ac:picMk id="5" creationId="{3E033F69-515D-48CA-A337-C51DA942D87F}"/>
+          </ac:picMkLst>
+        </pc:picChg>
+      </pc:sldChg>
+      <pc:sldChg chg="addSp delSp modSp add">
+        <pc:chgData name="Md Kauser Ahmmed" userId="81e39d19-8d5c-4ffe-9a82-20799efac8e0" providerId="ADAL" clId="{3A55CCAE-749B-4817-8638-97B22656D31F}" dt="2020-09-18T15:41:32.007" v="927" actId="14100"/>
+        <pc:sldMkLst>
+          <pc:docMk/>
+          <pc:sldMk cId="705476752" sldId="298"/>
+        </pc:sldMkLst>
+        <pc:spChg chg="mod">
+          <ac:chgData name="Md Kauser Ahmmed" userId="81e39d19-8d5c-4ffe-9a82-20799efac8e0" providerId="ADAL" clId="{3A55CCAE-749B-4817-8638-97B22656D31F}" dt="2020-09-18T15:39:58.812" v="920"/>
+          <ac:spMkLst>
+            <pc:docMk/>
+            <pc:sldMk cId="705476752" sldId="298"/>
+            <ac:spMk id="2" creationId="{6883D339-FDDE-4E8E-B654-A4D896D93106}"/>
+          </ac:spMkLst>
+        </pc:spChg>
+        <pc:spChg chg="add del">
+          <ac:chgData name="Md Kauser Ahmmed" userId="81e39d19-8d5c-4ffe-9a82-20799efac8e0" providerId="ADAL" clId="{3A55CCAE-749B-4817-8638-97B22656D31F}" dt="2020-09-18T15:40:55.751" v="924" actId="931"/>
+          <ac:spMkLst>
+            <pc:docMk/>
+            <pc:sldMk cId="705476752" sldId="298"/>
+            <ac:spMk id="3" creationId="{D0852596-C9B0-4CA4-8B57-52A2D2058BE8}"/>
+          </ac:spMkLst>
+        </pc:spChg>
+        <pc:picChg chg="add del mod">
+          <ac:chgData name="Md Kauser Ahmmed" userId="81e39d19-8d5c-4ffe-9a82-20799efac8e0" providerId="ADAL" clId="{3A55CCAE-749B-4817-8638-97B22656D31F}" dt="2020-09-18T15:40:51.006" v="923" actId="931"/>
+          <ac:picMkLst>
+            <pc:docMk/>
+            <pc:sldMk cId="705476752" sldId="298"/>
+            <ac:picMk id="5" creationId="{F3D5934A-936B-4B96-A866-A5B1B6329379}"/>
+          </ac:picMkLst>
+        </pc:picChg>
+        <pc:picChg chg="add mod">
+          <ac:chgData name="Md Kauser Ahmmed" userId="81e39d19-8d5c-4ffe-9a82-20799efac8e0" providerId="ADAL" clId="{3A55CCAE-749B-4817-8638-97B22656D31F}" dt="2020-09-18T15:41:32.007" v="927" actId="14100"/>
+          <ac:picMkLst>
+            <pc:docMk/>
+            <pc:sldMk cId="705476752" sldId="298"/>
+            <ac:picMk id="7" creationId="{302750BE-E081-45B3-9336-07BB22507ECB}"/>
+          </ac:picMkLst>
+        </pc:picChg>
+      </pc:sldChg>
+      <pc:sldChg chg="addSp delSp modSp add mod setBg">
+        <pc:chgData name="Md Kauser Ahmmed" userId="81e39d19-8d5c-4ffe-9a82-20799efac8e0" providerId="ADAL" clId="{3A55CCAE-749B-4817-8638-97B22656D31F}" dt="2020-09-18T16:30:40.735" v="940" actId="20577"/>
+        <pc:sldMkLst>
+          <pc:docMk/>
+          <pc:sldMk cId="2179309757" sldId="299"/>
+        </pc:sldMkLst>
+        <pc:spChg chg="mod">
+          <ac:chgData name="Md Kauser Ahmmed" userId="81e39d19-8d5c-4ffe-9a82-20799efac8e0" providerId="ADAL" clId="{3A55CCAE-749B-4817-8638-97B22656D31F}" dt="2020-09-18T16:30:40.735" v="940" actId="20577"/>
+          <ac:spMkLst>
+            <pc:docMk/>
+            <pc:sldMk cId="2179309757" sldId="299"/>
+            <ac:spMk id="2" creationId="{284849D0-B00B-41F8-A8DC-CF09038960BF}"/>
+          </ac:spMkLst>
+        </pc:spChg>
+        <pc:spChg chg="del">
+          <ac:chgData name="Md Kauser Ahmmed" userId="81e39d19-8d5c-4ffe-9a82-20799efac8e0" providerId="ADAL" clId="{3A55CCAE-749B-4817-8638-97B22656D31F}" dt="2020-09-18T16:30:27.228" v="936"/>
+          <ac:spMkLst>
+            <pc:docMk/>
+            <pc:sldMk cId="2179309757" sldId="299"/>
+            <ac:spMk id="3" creationId="{7AF86B43-08EF-4209-AA89-C3DBA6DF7637}"/>
+          </ac:spMkLst>
+        </pc:spChg>
+        <pc:spChg chg="add">
+          <ac:chgData name="Md Kauser Ahmmed" userId="81e39d19-8d5c-4ffe-9a82-20799efac8e0" providerId="ADAL" clId="{3A55CCAE-749B-4817-8638-97B22656D31F}" dt="2020-09-18T16:30:30.922" v="937" actId="26606"/>
+          <ac:spMkLst>
+            <pc:docMk/>
+            <pc:sldMk cId="2179309757" sldId="299"/>
+            <ac:spMk id="9" creationId="{53F29798-D584-4792-9B62-3F5F5C36D619}"/>
+          </ac:spMkLst>
+        </pc:spChg>
+        <pc:graphicFrameChg chg="add mod modGraphic">
+          <ac:chgData name="Md Kauser Ahmmed" userId="81e39d19-8d5c-4ffe-9a82-20799efac8e0" providerId="ADAL" clId="{3A55CCAE-749B-4817-8638-97B22656D31F}" dt="2020-09-18T16:30:30.922" v="937" actId="26606"/>
+          <ac:graphicFrameMkLst>
+            <pc:docMk/>
+            <pc:sldMk cId="2179309757" sldId="299"/>
+            <ac:graphicFrameMk id="4" creationId="{C11BA0E5-C2A0-48A5-A877-2B6C33792D4F}"/>
+          </ac:graphicFrameMkLst>
+        </pc:graphicFrameChg>
+      </pc:sldChg>
+    </pc:docChg>
+  </pc:docChgLst>
+  <pc:docChgLst>
+    <pc:chgData name="Md Kauser Ahmmed" userId="81e39d19-8d5c-4ffe-9a82-20799efac8e0" providerId="ADAL" clId="{30EBAA48-D00D-436C-B3AC-B0E7F62EC0CE}"/>
+    <pc:docChg chg="undo custSel mod addSld delSld modSld">
+      <pc:chgData name="Md Kauser Ahmmed" userId="81e39d19-8d5c-4ffe-9a82-20799efac8e0" providerId="ADAL" clId="{30EBAA48-D00D-436C-B3AC-B0E7F62EC0CE}" dt="2020-09-04T17:27:46.801" v="1828" actId="20577"/>
+      <pc:docMkLst>
+        <pc:docMk/>
+      </pc:docMkLst>
+      <pc:sldChg chg="modSp">
+        <pc:chgData name="Md Kauser Ahmmed" userId="81e39d19-8d5c-4ffe-9a82-20799efac8e0" providerId="ADAL" clId="{30EBAA48-D00D-436C-B3AC-B0E7F62EC0CE}" dt="2020-09-04T17:19:17.712" v="1550" actId="20577"/>
+        <pc:sldMkLst>
+          <pc:docMk/>
+          <pc:sldMk cId="1659930921" sldId="256"/>
+        </pc:sldMkLst>
+        <pc:spChg chg="mod">
+          <ac:chgData name="Md Kauser Ahmmed" userId="81e39d19-8d5c-4ffe-9a82-20799efac8e0" providerId="ADAL" clId="{30EBAA48-D00D-436C-B3AC-B0E7F62EC0CE}" dt="2020-09-04T17:07:28.281" v="672" actId="20577"/>
+          <ac:spMkLst>
+            <pc:docMk/>
+            <pc:sldMk cId="1659930921" sldId="256"/>
+            <ac:spMk id="5" creationId="{16BADCCF-8A79-4BE7-9453-DA10015FD92C}"/>
+          </ac:spMkLst>
+        </pc:spChg>
+        <pc:spChg chg="mod">
+          <ac:chgData name="Md Kauser Ahmmed" userId="81e39d19-8d5c-4ffe-9a82-20799efac8e0" providerId="ADAL" clId="{30EBAA48-D00D-436C-B3AC-B0E7F62EC0CE}" dt="2020-09-04T17:19:17.712" v="1550" actId="20577"/>
+          <ac:spMkLst>
+            <pc:docMk/>
+            <pc:sldMk cId="1659930921" sldId="256"/>
+            <ac:spMk id="6" creationId="{1EEBDA52-BE46-433D-AB6E-4D2949F916FF}"/>
+          </ac:spMkLst>
+        </pc:spChg>
+      </pc:sldChg>
+      <pc:sldChg chg="addSp delSp modSp">
+        <pc:chgData name="Md Kauser Ahmmed" userId="81e39d19-8d5c-4ffe-9a82-20799efac8e0" providerId="ADAL" clId="{30EBAA48-D00D-436C-B3AC-B0E7F62EC0CE}" dt="2020-09-04T17:06:27.336" v="625" actId="1076"/>
+        <pc:sldMkLst>
+          <pc:docMk/>
+          <pc:sldMk cId="4056875156" sldId="259"/>
+        </pc:sldMkLst>
+        <pc:spChg chg="mod">
+          <ac:chgData name="Md Kauser Ahmmed" userId="81e39d19-8d5c-4ffe-9a82-20799efac8e0" providerId="ADAL" clId="{30EBAA48-D00D-436C-B3AC-B0E7F62EC0CE}" dt="2020-09-04T17:05:11.935" v="619" actId="1035"/>
+          <ac:spMkLst>
+            <pc:docMk/>
+            <pc:sldMk cId="4056875156" sldId="259"/>
+            <ac:spMk id="2" creationId="{45F2AC63-EFDA-4E7C-A71C-7D3EE46A34E8}"/>
+          </ac:spMkLst>
+        </pc:spChg>
+        <pc:spChg chg="mod">
+          <ac:chgData name="Md Kauser Ahmmed" userId="81e39d19-8d5c-4ffe-9a82-20799efac8e0" providerId="ADAL" clId="{30EBAA48-D00D-436C-B3AC-B0E7F62EC0CE}" dt="2020-09-04T17:05:00.355" v="607" actId="20577"/>
+          <ac:spMkLst>
+            <pc:docMk/>
+            <pc:sldMk cId="4056875156" sldId="259"/>
+            <ac:spMk id="5" creationId="{3B3F8C9C-33C8-4308-AE5B-78786A407AED}"/>
+          </ac:spMkLst>
+        </pc:spChg>
+        <pc:graphicFrameChg chg="del">
+          <ac:chgData name="Md Kauser Ahmmed" userId="81e39d19-8d5c-4ffe-9a82-20799efac8e0" providerId="ADAL" clId="{30EBAA48-D00D-436C-B3AC-B0E7F62EC0CE}" dt="2020-09-04T17:03:47.949" v="309" actId="478"/>
+          <ac:graphicFrameMkLst>
+            <pc:docMk/>
+            <pc:sldMk cId="4056875156" sldId="259"/>
+            <ac:graphicFrameMk id="3" creationId="{D12EED76-112D-46B0-A106-5896D41AC26E}"/>
+          </ac:graphicFrameMkLst>
+        </pc:graphicFrameChg>
+        <pc:picChg chg="add mod">
+          <ac:chgData name="Md Kauser Ahmmed" userId="81e39d19-8d5c-4ffe-9a82-20799efac8e0" providerId="ADAL" clId="{30EBAA48-D00D-436C-B3AC-B0E7F62EC0CE}" dt="2020-09-04T17:06:27.336" v="625" actId="1076"/>
+          <ac:picMkLst>
+            <pc:docMk/>
+            <pc:sldMk cId="4056875156" sldId="259"/>
+            <ac:picMk id="6" creationId="{857A0EE1-9F4D-40BE-A91D-315A0B1C9A51}"/>
+          </ac:picMkLst>
+        </pc:picChg>
+      </pc:sldChg>
+      <pc:sldChg chg="modSp">
+        <pc:chgData name="Md Kauser Ahmmed" userId="81e39d19-8d5c-4ffe-9a82-20799efac8e0" providerId="ADAL" clId="{30EBAA48-D00D-436C-B3AC-B0E7F62EC0CE}" dt="2020-09-04T17:00:46.719" v="19" actId="20577"/>
+        <pc:sldMkLst>
+          <pc:docMk/>
+          <pc:sldMk cId="1010047731" sldId="271"/>
+        </pc:sldMkLst>
+        <pc:spChg chg="mod">
+          <ac:chgData name="Md Kauser Ahmmed" userId="81e39d19-8d5c-4ffe-9a82-20799efac8e0" providerId="ADAL" clId="{30EBAA48-D00D-436C-B3AC-B0E7F62EC0CE}" dt="2020-09-04T17:00:46.719" v="19" actId="20577"/>
+          <ac:spMkLst>
+            <pc:docMk/>
+            <pc:sldMk cId="1010047731" sldId="271"/>
+            <ac:spMk id="3" creationId="{771893B1-979C-4E59-951A-F29EB496A9C1}"/>
+          </ac:spMkLst>
+        </pc:spChg>
+      </pc:sldChg>
+      <pc:sldChg chg="del">
+        <pc:chgData name="Md Kauser Ahmmed" userId="81e39d19-8d5c-4ffe-9a82-20799efac8e0" providerId="ADAL" clId="{30EBAA48-D00D-436C-B3AC-B0E7F62EC0CE}" dt="2020-09-04T17:25:28.585" v="1702" actId="2696"/>
+        <pc:sldMkLst>
+          <pc:docMk/>
+          <pc:sldMk cId="1319027720" sldId="277"/>
+        </pc:sldMkLst>
+      </pc:sldChg>
+      <pc:sldChg chg="addSp delSp modSp">
+        <pc:chgData name="Md Kauser Ahmmed" userId="81e39d19-8d5c-4ffe-9a82-20799efac8e0" providerId="ADAL" clId="{30EBAA48-D00D-436C-B3AC-B0E7F62EC0CE}" dt="2020-09-04T17:27:46.801" v="1828" actId="20577"/>
+        <pc:sldMkLst>
+          <pc:docMk/>
+          <pc:sldMk cId="1891870474" sldId="284"/>
+        </pc:sldMkLst>
+        <pc:spChg chg="mod">
+          <ac:chgData name="Md Kauser Ahmmed" userId="81e39d19-8d5c-4ffe-9a82-20799efac8e0" providerId="ADAL" clId="{30EBAA48-D00D-436C-B3AC-B0E7F62EC0CE}" dt="2020-09-04T17:23:39.767" v="1602" actId="26606"/>
+          <ac:spMkLst>
+            <pc:docMk/>
+            <pc:sldMk cId="1891870474" sldId="284"/>
+            <ac:spMk id="2" creationId="{1706FC24-AA1D-4CDE-A461-17789365CC0D}"/>
+          </ac:spMkLst>
+        </pc:spChg>
+        <pc:spChg chg="add mod">
+          <ac:chgData name="Md Kauser Ahmmed" userId="81e39d19-8d5c-4ffe-9a82-20799efac8e0" providerId="ADAL" clId="{30EBAA48-D00D-436C-B3AC-B0E7F62EC0CE}" dt="2020-09-04T17:27:46.801" v="1828" actId="20577"/>
+          <ac:spMkLst>
+            <pc:docMk/>
+            <pc:sldMk cId="1891870474" sldId="284"/>
+            <ac:spMk id="5" creationId="{C94B69E8-D3E4-4987-BA3F-9A628ECE23B0}"/>
+          </ac:spMkLst>
+        </pc:spChg>
+        <pc:spChg chg="del">
+          <ac:chgData name="Md Kauser Ahmmed" userId="81e39d19-8d5c-4ffe-9a82-20799efac8e0" providerId="ADAL" clId="{30EBAA48-D00D-436C-B3AC-B0E7F62EC0CE}" dt="2020-09-04T17:23:39.767" v="1602" actId="26606"/>
+          <ac:spMkLst>
+            <pc:docMk/>
+            <pc:sldMk cId="1891870474" sldId="284"/>
+            <ac:spMk id="11" creationId="{594D6AA1-A0E1-45F9-8E25-BAB8092293CC}"/>
+          </ac:spMkLst>
+        </pc:spChg>
+        <pc:spChg chg="add">
+          <ac:chgData name="Md Kauser Ahmmed" userId="81e39d19-8d5c-4ffe-9a82-20799efac8e0" providerId="ADAL" clId="{30EBAA48-D00D-436C-B3AC-B0E7F62EC0CE}" dt="2020-09-04T17:23:39.767" v="1602" actId="26606"/>
+          <ac:spMkLst>
+            <pc:docMk/>
+            <pc:sldMk cId="1891870474" sldId="284"/>
+            <ac:spMk id="13" creationId="{53F29798-D584-4792-9B62-3F5F5C36D619}"/>
+          </ac:spMkLst>
+        </pc:spChg>
+        <pc:spChg chg="del">
+          <ac:chgData name="Md Kauser Ahmmed" userId="81e39d19-8d5c-4ffe-9a82-20799efac8e0" providerId="ADAL" clId="{30EBAA48-D00D-436C-B3AC-B0E7F62EC0CE}" dt="2020-09-04T17:20:36.365" v="1585" actId="478"/>
+          <ac:spMkLst>
+            <pc:docMk/>
+            <pc:sldMk cId="1891870474" sldId="284"/>
+            <ac:spMk id="15" creationId="{3A0FE97A-9B86-4A94-BFB9-CF69866376F5}"/>
+          </ac:spMkLst>
+        </pc:spChg>
+        <pc:graphicFrameChg chg="del">
+          <ac:chgData name="Md Kauser Ahmmed" userId="81e39d19-8d5c-4ffe-9a82-20799efac8e0" providerId="ADAL" clId="{30EBAA48-D00D-436C-B3AC-B0E7F62EC0CE}" dt="2020-09-04T17:20:33.302" v="1584" actId="478"/>
+          <ac:graphicFrameMkLst>
+            <pc:docMk/>
+            <pc:sldMk cId="1891870474" sldId="284"/>
+            <ac:graphicFrameMk id="6" creationId="{6BEC8AE8-700F-4481-99AE-0B23D2F93E1E}"/>
+          </ac:graphicFrameMkLst>
+        </pc:graphicFrameChg>
+        <pc:picChg chg="add mod">
+          <ac:chgData name="Md Kauser Ahmmed" userId="81e39d19-8d5c-4ffe-9a82-20799efac8e0" providerId="ADAL" clId="{30EBAA48-D00D-436C-B3AC-B0E7F62EC0CE}" dt="2020-09-04T17:23:44.210" v="1603" actId="1076"/>
+          <ac:picMkLst>
+            <pc:docMk/>
+            <pc:sldMk cId="1891870474" sldId="284"/>
+            <ac:picMk id="4" creationId="{9E4A5E19-FA61-498A-A0DC-E8D60EF47F0F}"/>
+          </ac:picMkLst>
+        </pc:picChg>
+      </pc:sldChg>
+      <pc:sldChg chg="del">
+        <pc:chgData name="Md Kauser Ahmmed" userId="81e39d19-8d5c-4ffe-9a82-20799efac8e0" providerId="ADAL" clId="{30EBAA48-D00D-436C-B3AC-B0E7F62EC0CE}" dt="2020-09-04T17:25:28.597" v="1703" actId="2696"/>
+        <pc:sldMkLst>
+          <pc:docMk/>
+          <pc:sldMk cId="3272573321" sldId="285"/>
+        </pc:sldMkLst>
+      </pc:sldChg>
+      <pc:sldChg chg="modSp add">
+        <pc:chgData name="Md Kauser Ahmmed" userId="81e39d19-8d5c-4ffe-9a82-20799efac8e0" providerId="ADAL" clId="{30EBAA48-D00D-436C-B3AC-B0E7F62EC0CE}" dt="2020-09-04T17:19:45.093" v="1555" actId="20577"/>
+        <pc:sldMkLst>
+          <pc:docMk/>
+          <pc:sldMk cId="4065790106" sldId="286"/>
+        </pc:sldMkLst>
+        <pc:spChg chg="mod">
+          <ac:chgData name="Md Kauser Ahmmed" userId="81e39d19-8d5c-4ffe-9a82-20799efac8e0" providerId="ADAL" clId="{30EBAA48-D00D-436C-B3AC-B0E7F62EC0CE}" dt="2020-09-04T17:19:45.093" v="1555" actId="20577"/>
+          <ac:spMkLst>
+            <pc:docMk/>
+            <pc:sldMk cId="4065790106" sldId="286"/>
+            <ac:spMk id="6" creationId="{1EEBDA52-BE46-433D-AB6E-4D2949F916FF}"/>
+          </ac:spMkLst>
+        </pc:spChg>
+      </pc:sldChg>
+      <pc:sldChg chg="modSp add">
+        <pc:chgData name="Md Kauser Ahmmed" userId="81e39d19-8d5c-4ffe-9a82-20799efac8e0" providerId="ADAL" clId="{30EBAA48-D00D-436C-B3AC-B0E7F62EC0CE}" dt="2020-09-04T17:20:04.603" v="1561" actId="207"/>
+        <pc:sldMkLst>
+          <pc:docMk/>
+          <pc:sldMk cId="4210391493" sldId="287"/>
+        </pc:sldMkLst>
+        <pc:spChg chg="mod">
+          <ac:chgData name="Md Kauser Ahmmed" userId="81e39d19-8d5c-4ffe-9a82-20799efac8e0" providerId="ADAL" clId="{30EBAA48-D00D-436C-B3AC-B0E7F62EC0CE}" dt="2020-09-04T17:20:04.603" v="1561" actId="207"/>
+          <ac:spMkLst>
+            <pc:docMk/>
+            <pc:sldMk cId="4210391493" sldId="287"/>
+            <ac:spMk id="6" creationId="{1EEBDA52-BE46-433D-AB6E-4D2949F916FF}"/>
+          </ac:spMkLst>
+        </pc:spChg>
+      </pc:sldChg>
+      <pc:sldChg chg="modSp add">
+        <pc:chgData name="Md Kauser Ahmmed" userId="81e39d19-8d5c-4ffe-9a82-20799efac8e0" providerId="ADAL" clId="{30EBAA48-D00D-436C-B3AC-B0E7F62EC0CE}" dt="2020-09-04T17:18:12.227" v="1503" actId="57"/>
+        <pc:sldMkLst>
+          <pc:docMk/>
+          <pc:sldMk cId="3020027435" sldId="288"/>
+        </pc:sldMkLst>
+        <pc:spChg chg="mod">
+          <ac:chgData name="Md Kauser Ahmmed" userId="81e39d19-8d5c-4ffe-9a82-20799efac8e0" providerId="ADAL" clId="{30EBAA48-D00D-436C-B3AC-B0E7F62EC0CE}" dt="2020-09-04T17:08:23.476" v="695" actId="20577"/>
+          <ac:spMkLst>
+            <pc:docMk/>
+            <pc:sldMk cId="3020027435" sldId="288"/>
+            <ac:spMk id="2" creationId="{11C6F554-558A-4032-B80E-4A49925BBC1F}"/>
+          </ac:spMkLst>
+        </pc:spChg>
+        <pc:spChg chg="mod">
+          <ac:chgData name="Md Kauser Ahmmed" userId="81e39d19-8d5c-4ffe-9a82-20799efac8e0" providerId="ADAL" clId="{30EBAA48-D00D-436C-B3AC-B0E7F62EC0CE}" dt="2020-09-04T17:18:12.227" v="1503" actId="57"/>
+          <ac:spMkLst>
+            <pc:docMk/>
+            <pc:sldMk cId="3020027435" sldId="288"/>
+            <ac:spMk id="3" creationId="{FFBD79E3-1E6C-466C-9014-4AD4B20A9108}"/>
+          </ac:spMkLst>
+        </pc:spChg>
+      </pc:sldChg>
+    </pc:docChg>
+  </pc:docChgLst>
+  <pc:docChgLst>
     <pc:chgData name="Md Kauser Ahmmed" userId="81e39d19-8d5c-4ffe-9a82-20799efac8e0" providerId="ADAL" clId="{3FB56EDB-2F38-4CA6-8122-BDEE3AA03212}"/>
     <pc:docChg chg="undo custSel mod addSld delSld modSld">
       <pc:chgData name="Md Kauser Ahmmed" userId="81e39d19-8d5c-4ffe-9a82-20799efac8e0" providerId="ADAL" clId="{3FB56EDB-2F38-4CA6-8122-BDEE3AA03212}" dt="2020-08-13T16:17:18.026" v="415" actId="26606"/>
@@ -1639,218 +1863,183 @@
     </pc:docChg>
   </pc:docChgLst>
   <pc:docChgLst>
-    <pc:chgData name="Md Kauser Ahmmed" userId="81e39d19-8d5c-4ffe-9a82-20799efac8e0" providerId="ADAL" clId="{30EBAA48-D00D-436C-B3AC-B0E7F62EC0CE}"/>
-    <pc:docChg chg="undo custSel mod addSld delSld modSld">
-      <pc:chgData name="Md Kauser Ahmmed" userId="81e39d19-8d5c-4ffe-9a82-20799efac8e0" providerId="ADAL" clId="{30EBAA48-D00D-436C-B3AC-B0E7F62EC0CE}" dt="2020-09-04T17:27:46.801" v="1828" actId="20577"/>
+    <pc:chgData name="Md Kauser Ahmmed" userId="81e39d19-8d5c-4ffe-9a82-20799efac8e0" providerId="ADAL" clId="{2249E5F1-46C3-4B03-B08E-8C23AE925CD5}"/>
+    <pc:docChg chg="undo custSel modSld">
+      <pc:chgData name="Md Kauser Ahmmed" userId="81e39d19-8d5c-4ffe-9a82-20799efac8e0" providerId="ADAL" clId="{2249E5F1-46C3-4B03-B08E-8C23AE925CD5}" dt="2021-05-07T17:18:45.185" v="33" actId="20577"/>
       <pc:docMkLst>
         <pc:docMk/>
       </pc:docMkLst>
-      <pc:sldChg chg="modSp">
-        <pc:chgData name="Md Kauser Ahmmed" userId="81e39d19-8d5c-4ffe-9a82-20799efac8e0" providerId="ADAL" clId="{30EBAA48-D00D-436C-B3AC-B0E7F62EC0CE}" dt="2020-09-04T17:19:17.712" v="1550" actId="20577"/>
+      <pc:sldChg chg="addSp delSp modSp mod">
+        <pc:chgData name="Md Kauser Ahmmed" userId="81e39d19-8d5c-4ffe-9a82-20799efac8e0" providerId="ADAL" clId="{2249E5F1-46C3-4B03-B08E-8C23AE925CD5}" dt="2021-05-07T17:16:05.439" v="28"/>
         <pc:sldMkLst>
           <pc:docMk/>
-          <pc:sldMk cId="1659930921" sldId="256"/>
+          <pc:sldMk cId="4159251590" sldId="319"/>
         </pc:sldMkLst>
-        <pc:spChg chg="mod">
-          <ac:chgData name="Md Kauser Ahmmed" userId="81e39d19-8d5c-4ffe-9a82-20799efac8e0" providerId="ADAL" clId="{30EBAA48-D00D-436C-B3AC-B0E7F62EC0CE}" dt="2020-09-04T17:07:28.281" v="672" actId="20577"/>
+        <pc:spChg chg="add del mod">
+          <ac:chgData name="Md Kauser Ahmmed" userId="81e39d19-8d5c-4ffe-9a82-20799efac8e0" providerId="ADAL" clId="{2249E5F1-46C3-4B03-B08E-8C23AE925CD5}" dt="2021-05-07T17:12:26.548" v="6" actId="478"/>
           <ac:spMkLst>
             <pc:docMk/>
-            <pc:sldMk cId="1659930921" sldId="256"/>
-            <ac:spMk id="5" creationId="{16BADCCF-8A79-4BE7-9453-DA10015FD92C}"/>
+            <pc:sldMk cId="4159251590" sldId="319"/>
+            <ac:spMk id="4" creationId="{08611F08-F275-4B33-BD16-AB13215EB429}"/>
+          </ac:spMkLst>
+        </pc:spChg>
+        <pc:spChg chg="add del mod">
+          <ac:chgData name="Md Kauser Ahmmed" userId="81e39d19-8d5c-4ffe-9a82-20799efac8e0" providerId="ADAL" clId="{2249E5F1-46C3-4B03-B08E-8C23AE925CD5}" dt="2021-05-07T17:16:05.439" v="28"/>
+          <ac:spMkLst>
+            <pc:docMk/>
+            <pc:sldMk cId="4159251590" sldId="319"/>
+            <ac:spMk id="6" creationId="{433CAB71-81E0-4E11-8836-5A03EA92AF98}"/>
+          </ac:spMkLst>
+        </pc:spChg>
+        <pc:spChg chg="add del mod">
+          <ac:chgData name="Md Kauser Ahmmed" userId="81e39d19-8d5c-4ffe-9a82-20799efac8e0" providerId="ADAL" clId="{2249E5F1-46C3-4B03-B08E-8C23AE925CD5}" dt="2021-05-07T17:12:40.674" v="9" actId="931"/>
+          <ac:spMkLst>
+            <pc:docMk/>
+            <pc:sldMk cId="4159251590" sldId="319"/>
+            <ac:spMk id="8" creationId="{2908D591-1C78-4D30-8872-6A68422D79F1}"/>
+          </ac:spMkLst>
+        </pc:spChg>
+        <pc:picChg chg="add del">
+          <ac:chgData name="Md Kauser Ahmmed" userId="81e39d19-8d5c-4ffe-9a82-20799efac8e0" providerId="ADAL" clId="{2249E5F1-46C3-4B03-B08E-8C23AE925CD5}" dt="2021-05-07T17:12:30.246" v="8" actId="478"/>
+          <ac:picMkLst>
+            <pc:docMk/>
+            <pc:sldMk cId="4159251590" sldId="319"/>
+            <ac:picMk id="5" creationId="{EEFDDC02-9CD2-44F7-9F0D-8417C900CFBA}"/>
+          </ac:picMkLst>
+        </pc:picChg>
+        <pc:picChg chg="add mod ord">
+          <ac:chgData name="Md Kauser Ahmmed" userId="81e39d19-8d5c-4ffe-9a82-20799efac8e0" providerId="ADAL" clId="{2249E5F1-46C3-4B03-B08E-8C23AE925CD5}" dt="2021-05-07T17:12:49.218" v="12" actId="167"/>
+          <ac:picMkLst>
+            <pc:docMk/>
+            <pc:sldMk cId="4159251590" sldId="319"/>
+            <ac:picMk id="11" creationId="{A249AACE-0BEE-487E-ABCD-8A9AE4F852EE}"/>
+          </ac:picMkLst>
+        </pc:picChg>
+      </pc:sldChg>
+      <pc:sldChg chg="addSp delSp modSp mod">
+        <pc:chgData name="Md Kauser Ahmmed" userId="81e39d19-8d5c-4ffe-9a82-20799efac8e0" providerId="ADAL" clId="{2249E5F1-46C3-4B03-B08E-8C23AE925CD5}" dt="2021-05-07T17:16:53.071" v="29"/>
+        <pc:sldMkLst>
+          <pc:docMk/>
+          <pc:sldMk cId="771960247" sldId="320"/>
+        </pc:sldMkLst>
+        <pc:spChg chg="add del mod">
+          <ac:chgData name="Md Kauser Ahmmed" userId="81e39d19-8d5c-4ffe-9a82-20799efac8e0" providerId="ADAL" clId="{2249E5F1-46C3-4B03-B08E-8C23AE925CD5}" dt="2021-05-07T17:12:23.252" v="5" actId="478"/>
+          <ac:spMkLst>
+            <pc:docMk/>
+            <pc:sldMk cId="771960247" sldId="320"/>
+            <ac:spMk id="4" creationId="{E6B0B8DA-3F06-4B71-8434-3B37C2BBECC6}"/>
           </ac:spMkLst>
         </pc:spChg>
         <pc:spChg chg="mod">
-          <ac:chgData name="Md Kauser Ahmmed" userId="81e39d19-8d5c-4ffe-9a82-20799efac8e0" providerId="ADAL" clId="{30EBAA48-D00D-436C-B3AC-B0E7F62EC0CE}" dt="2020-09-04T17:19:17.712" v="1550" actId="20577"/>
+          <ac:chgData name="Md Kauser Ahmmed" userId="81e39d19-8d5c-4ffe-9a82-20799efac8e0" providerId="ADAL" clId="{2249E5F1-46C3-4B03-B08E-8C23AE925CD5}" dt="2021-05-07T17:16:53.071" v="29"/>
           <ac:spMkLst>
             <pc:docMk/>
-            <pc:sldMk cId="1659930921" sldId="256"/>
-            <ac:spMk id="6" creationId="{1EEBDA52-BE46-433D-AB6E-4D2949F916FF}"/>
+            <pc:sldMk cId="771960247" sldId="320"/>
+            <ac:spMk id="7" creationId="{47B0EFF6-844E-4C06-A6BA-0569FBC41C3D}"/>
           </ac:spMkLst>
         </pc:spChg>
+        <pc:spChg chg="add del mod">
+          <ac:chgData name="Md Kauser Ahmmed" userId="81e39d19-8d5c-4ffe-9a82-20799efac8e0" providerId="ADAL" clId="{2249E5F1-46C3-4B03-B08E-8C23AE925CD5}" dt="2021-05-07T17:13:06.902" v="14" actId="931"/>
+          <ac:spMkLst>
+            <pc:docMk/>
+            <pc:sldMk cId="771960247" sldId="320"/>
+            <ac:spMk id="8" creationId="{29188DB9-96E3-48D0-A0A8-03410D395F29}"/>
+          </ac:spMkLst>
+        </pc:spChg>
+        <pc:picChg chg="add del">
+          <ac:chgData name="Md Kauser Ahmmed" userId="81e39d19-8d5c-4ffe-9a82-20799efac8e0" providerId="ADAL" clId="{2249E5F1-46C3-4B03-B08E-8C23AE925CD5}" dt="2021-05-07T17:12:55.541" v="13" actId="478"/>
+          <ac:picMkLst>
+            <pc:docMk/>
+            <pc:sldMk cId="771960247" sldId="320"/>
+            <ac:picMk id="5" creationId="{11706AC4-668D-4A40-86D9-221FFFFA5604}"/>
+          </ac:picMkLst>
+        </pc:picChg>
+        <pc:picChg chg="add mod ord">
+          <ac:chgData name="Md Kauser Ahmmed" userId="81e39d19-8d5c-4ffe-9a82-20799efac8e0" providerId="ADAL" clId="{2249E5F1-46C3-4B03-B08E-8C23AE925CD5}" dt="2021-05-07T17:13:17.432" v="17" actId="167"/>
+          <ac:picMkLst>
+            <pc:docMk/>
+            <pc:sldMk cId="771960247" sldId="320"/>
+            <ac:picMk id="11" creationId="{CCDA9C82-3A1C-4D12-B3C5-78C733CDAF6B}"/>
+          </ac:picMkLst>
+        </pc:picChg>
       </pc:sldChg>
-      <pc:sldChg chg="addSp delSp modSp">
-        <pc:chgData name="Md Kauser Ahmmed" userId="81e39d19-8d5c-4ffe-9a82-20799efac8e0" providerId="ADAL" clId="{30EBAA48-D00D-436C-B3AC-B0E7F62EC0CE}" dt="2020-09-04T17:06:27.336" v="625" actId="1076"/>
+      <pc:sldChg chg="addSp delSp modSp mod">
+        <pc:chgData name="Md Kauser Ahmmed" userId="81e39d19-8d5c-4ffe-9a82-20799efac8e0" providerId="ADAL" clId="{2249E5F1-46C3-4B03-B08E-8C23AE925CD5}" dt="2021-05-07T17:17:33.600" v="30"/>
         <pc:sldMkLst>
           <pc:docMk/>
-          <pc:sldMk cId="4056875156" sldId="259"/>
+          <pc:sldMk cId="2090751126" sldId="321"/>
         </pc:sldMkLst>
-        <pc:spChg chg="mod">
-          <ac:chgData name="Md Kauser Ahmmed" userId="81e39d19-8d5c-4ffe-9a82-20799efac8e0" providerId="ADAL" clId="{30EBAA48-D00D-436C-B3AC-B0E7F62EC0CE}" dt="2020-09-04T17:05:11.935" v="619" actId="1035"/>
+        <pc:spChg chg="add del mod">
+          <ac:chgData name="Md Kauser Ahmmed" userId="81e39d19-8d5c-4ffe-9a82-20799efac8e0" providerId="ADAL" clId="{2249E5F1-46C3-4B03-B08E-8C23AE925CD5}" dt="2021-05-07T17:13:32.166" v="19" actId="931"/>
           <ac:spMkLst>
             <pc:docMk/>
-            <pc:sldMk cId="4056875156" sldId="259"/>
-            <ac:spMk id="2" creationId="{45F2AC63-EFDA-4E7C-A71C-7D3EE46A34E8}"/>
+            <pc:sldMk cId="2090751126" sldId="321"/>
+            <ac:spMk id="4" creationId="{F61AAD78-3BC9-4DB5-9FD9-67F7F9AB0DD1}"/>
           </ac:spMkLst>
         </pc:spChg>
         <pc:spChg chg="mod">
-          <ac:chgData name="Md Kauser Ahmmed" userId="81e39d19-8d5c-4ffe-9a82-20799efac8e0" providerId="ADAL" clId="{30EBAA48-D00D-436C-B3AC-B0E7F62EC0CE}" dt="2020-09-04T17:05:00.355" v="607" actId="20577"/>
+          <ac:chgData name="Md Kauser Ahmmed" userId="81e39d19-8d5c-4ffe-9a82-20799efac8e0" providerId="ADAL" clId="{2249E5F1-46C3-4B03-B08E-8C23AE925CD5}" dt="2021-05-07T17:17:33.600" v="30"/>
           <ac:spMkLst>
             <pc:docMk/>
-            <pc:sldMk cId="4056875156" sldId="259"/>
-            <ac:spMk id="5" creationId="{3B3F8C9C-33C8-4308-AE5B-78786A407AED}"/>
+            <pc:sldMk cId="2090751126" sldId="321"/>
+            <ac:spMk id="7" creationId="{DB6042F0-E10C-4DD4-9591-CF63D40B5929}"/>
           </ac:spMkLst>
         </pc:spChg>
-        <pc:graphicFrameChg chg="del">
-          <ac:chgData name="Md Kauser Ahmmed" userId="81e39d19-8d5c-4ffe-9a82-20799efac8e0" providerId="ADAL" clId="{30EBAA48-D00D-436C-B3AC-B0E7F62EC0CE}" dt="2020-09-04T17:03:47.949" v="309" actId="478"/>
-          <ac:graphicFrameMkLst>
-            <pc:docMk/>
-            <pc:sldMk cId="4056875156" sldId="259"/>
-            <ac:graphicFrameMk id="3" creationId="{D12EED76-112D-46B0-A106-5896D41AC26E}"/>
-          </ac:graphicFrameMkLst>
-        </pc:graphicFrameChg>
-        <pc:picChg chg="add mod">
-          <ac:chgData name="Md Kauser Ahmmed" userId="81e39d19-8d5c-4ffe-9a82-20799efac8e0" providerId="ADAL" clId="{30EBAA48-D00D-436C-B3AC-B0E7F62EC0CE}" dt="2020-09-04T17:06:27.336" v="625" actId="1076"/>
+        <pc:picChg chg="del">
+          <ac:chgData name="Md Kauser Ahmmed" userId="81e39d19-8d5c-4ffe-9a82-20799efac8e0" providerId="ADAL" clId="{2249E5F1-46C3-4B03-B08E-8C23AE925CD5}" dt="2021-05-07T17:13:20.815" v="18" actId="478"/>
           <ac:picMkLst>
             <pc:docMk/>
-            <pc:sldMk cId="4056875156" sldId="259"/>
-            <ac:picMk id="6" creationId="{857A0EE1-9F4D-40BE-A91D-315A0B1C9A51}"/>
+            <pc:sldMk cId="2090751126" sldId="321"/>
+            <ac:picMk id="5" creationId="{F62B1966-6EEC-43F7-84E0-EA1B2169DAAB}"/>
+          </ac:picMkLst>
+        </pc:picChg>
+        <pc:picChg chg="add mod ord">
+          <ac:chgData name="Md Kauser Ahmmed" userId="81e39d19-8d5c-4ffe-9a82-20799efac8e0" providerId="ADAL" clId="{2249E5F1-46C3-4B03-B08E-8C23AE925CD5}" dt="2021-05-07T17:13:37.990" v="22" actId="167"/>
+          <ac:picMkLst>
+            <pc:docMk/>
+            <pc:sldMk cId="2090751126" sldId="321"/>
+            <ac:picMk id="8" creationId="{AE426A0B-DB57-4F75-8EE9-F71A7725EA28}"/>
           </ac:picMkLst>
         </pc:picChg>
       </pc:sldChg>
-      <pc:sldChg chg="modSp">
-        <pc:chgData name="Md Kauser Ahmmed" userId="81e39d19-8d5c-4ffe-9a82-20799efac8e0" providerId="ADAL" clId="{30EBAA48-D00D-436C-B3AC-B0E7F62EC0CE}" dt="2020-09-04T17:00:46.719" v="19" actId="20577"/>
+      <pc:sldChg chg="addSp delSp modSp mod">
+        <pc:chgData name="Md Kauser Ahmmed" userId="81e39d19-8d5c-4ffe-9a82-20799efac8e0" providerId="ADAL" clId="{2249E5F1-46C3-4B03-B08E-8C23AE925CD5}" dt="2021-05-07T17:18:45.185" v="33" actId="20577"/>
         <pc:sldMkLst>
           <pc:docMk/>
-          <pc:sldMk cId="1010047731" sldId="271"/>
+          <pc:sldMk cId="3655570833" sldId="322"/>
         </pc:sldMkLst>
-        <pc:spChg chg="mod">
-          <ac:chgData name="Md Kauser Ahmmed" userId="81e39d19-8d5c-4ffe-9a82-20799efac8e0" providerId="ADAL" clId="{30EBAA48-D00D-436C-B3AC-B0E7F62EC0CE}" dt="2020-09-04T17:00:46.719" v="19" actId="20577"/>
+        <pc:spChg chg="add del mod">
+          <ac:chgData name="Md Kauser Ahmmed" userId="81e39d19-8d5c-4ffe-9a82-20799efac8e0" providerId="ADAL" clId="{2249E5F1-46C3-4B03-B08E-8C23AE925CD5}" dt="2021-05-07T17:14:00.352" v="24" actId="931"/>
           <ac:spMkLst>
             <pc:docMk/>
-            <pc:sldMk cId="1010047731" sldId="271"/>
-            <ac:spMk id="3" creationId="{771893B1-979C-4E59-951A-F29EB496A9C1}"/>
-          </ac:spMkLst>
-        </pc:spChg>
-      </pc:sldChg>
-      <pc:sldChg chg="del">
-        <pc:chgData name="Md Kauser Ahmmed" userId="81e39d19-8d5c-4ffe-9a82-20799efac8e0" providerId="ADAL" clId="{30EBAA48-D00D-436C-B3AC-B0E7F62EC0CE}" dt="2020-09-04T17:25:28.585" v="1702" actId="2696"/>
-        <pc:sldMkLst>
-          <pc:docMk/>
-          <pc:sldMk cId="1319027720" sldId="277"/>
-        </pc:sldMkLst>
-      </pc:sldChg>
-      <pc:sldChg chg="addSp delSp modSp">
-        <pc:chgData name="Md Kauser Ahmmed" userId="81e39d19-8d5c-4ffe-9a82-20799efac8e0" providerId="ADAL" clId="{30EBAA48-D00D-436C-B3AC-B0E7F62EC0CE}" dt="2020-09-04T17:27:46.801" v="1828" actId="20577"/>
-        <pc:sldMkLst>
-          <pc:docMk/>
-          <pc:sldMk cId="1891870474" sldId="284"/>
-        </pc:sldMkLst>
-        <pc:spChg chg="mod">
-          <ac:chgData name="Md Kauser Ahmmed" userId="81e39d19-8d5c-4ffe-9a82-20799efac8e0" providerId="ADAL" clId="{30EBAA48-D00D-436C-B3AC-B0E7F62EC0CE}" dt="2020-09-04T17:23:39.767" v="1602" actId="26606"/>
-          <ac:spMkLst>
-            <pc:docMk/>
-            <pc:sldMk cId="1891870474" sldId="284"/>
-            <ac:spMk id="2" creationId="{1706FC24-AA1D-4CDE-A461-17789365CC0D}"/>
-          </ac:spMkLst>
-        </pc:spChg>
-        <pc:spChg chg="add mod">
-          <ac:chgData name="Md Kauser Ahmmed" userId="81e39d19-8d5c-4ffe-9a82-20799efac8e0" providerId="ADAL" clId="{30EBAA48-D00D-436C-B3AC-B0E7F62EC0CE}" dt="2020-09-04T17:27:46.801" v="1828" actId="20577"/>
-          <ac:spMkLst>
-            <pc:docMk/>
-            <pc:sldMk cId="1891870474" sldId="284"/>
-            <ac:spMk id="5" creationId="{C94B69E8-D3E4-4987-BA3F-9A628ECE23B0}"/>
-          </ac:spMkLst>
-        </pc:spChg>
-        <pc:spChg chg="del">
-          <ac:chgData name="Md Kauser Ahmmed" userId="81e39d19-8d5c-4ffe-9a82-20799efac8e0" providerId="ADAL" clId="{30EBAA48-D00D-436C-B3AC-B0E7F62EC0CE}" dt="2020-09-04T17:23:39.767" v="1602" actId="26606"/>
-          <ac:spMkLst>
-            <pc:docMk/>
-            <pc:sldMk cId="1891870474" sldId="284"/>
-            <ac:spMk id="11" creationId="{594D6AA1-A0E1-45F9-8E25-BAB8092293CC}"/>
-          </ac:spMkLst>
-        </pc:spChg>
-        <pc:spChg chg="add">
-          <ac:chgData name="Md Kauser Ahmmed" userId="81e39d19-8d5c-4ffe-9a82-20799efac8e0" providerId="ADAL" clId="{30EBAA48-D00D-436C-B3AC-B0E7F62EC0CE}" dt="2020-09-04T17:23:39.767" v="1602" actId="26606"/>
-          <ac:spMkLst>
-            <pc:docMk/>
-            <pc:sldMk cId="1891870474" sldId="284"/>
-            <ac:spMk id="13" creationId="{53F29798-D584-4792-9B62-3F5F5C36D619}"/>
-          </ac:spMkLst>
-        </pc:spChg>
-        <pc:spChg chg="del">
-          <ac:chgData name="Md Kauser Ahmmed" userId="81e39d19-8d5c-4ffe-9a82-20799efac8e0" providerId="ADAL" clId="{30EBAA48-D00D-436C-B3AC-B0E7F62EC0CE}" dt="2020-09-04T17:20:36.365" v="1585" actId="478"/>
-          <ac:spMkLst>
-            <pc:docMk/>
-            <pc:sldMk cId="1891870474" sldId="284"/>
-            <ac:spMk id="15" creationId="{3A0FE97A-9B86-4A94-BFB9-CF69866376F5}"/>
-          </ac:spMkLst>
-        </pc:spChg>
-        <pc:graphicFrameChg chg="del">
-          <ac:chgData name="Md Kauser Ahmmed" userId="81e39d19-8d5c-4ffe-9a82-20799efac8e0" providerId="ADAL" clId="{30EBAA48-D00D-436C-B3AC-B0E7F62EC0CE}" dt="2020-09-04T17:20:33.302" v="1584" actId="478"/>
-          <ac:graphicFrameMkLst>
-            <pc:docMk/>
-            <pc:sldMk cId="1891870474" sldId="284"/>
-            <ac:graphicFrameMk id="6" creationId="{6BEC8AE8-700F-4481-99AE-0B23D2F93E1E}"/>
-          </ac:graphicFrameMkLst>
-        </pc:graphicFrameChg>
-        <pc:picChg chg="add mod">
-          <ac:chgData name="Md Kauser Ahmmed" userId="81e39d19-8d5c-4ffe-9a82-20799efac8e0" providerId="ADAL" clId="{30EBAA48-D00D-436C-B3AC-B0E7F62EC0CE}" dt="2020-09-04T17:23:44.210" v="1603" actId="1076"/>
-          <ac:picMkLst>
-            <pc:docMk/>
-            <pc:sldMk cId="1891870474" sldId="284"/>
-            <ac:picMk id="4" creationId="{9E4A5E19-FA61-498A-A0DC-E8D60EF47F0F}"/>
-          </ac:picMkLst>
-        </pc:picChg>
-      </pc:sldChg>
-      <pc:sldChg chg="del">
-        <pc:chgData name="Md Kauser Ahmmed" userId="81e39d19-8d5c-4ffe-9a82-20799efac8e0" providerId="ADAL" clId="{30EBAA48-D00D-436C-B3AC-B0E7F62EC0CE}" dt="2020-09-04T17:25:28.597" v="1703" actId="2696"/>
-        <pc:sldMkLst>
-          <pc:docMk/>
-          <pc:sldMk cId="3272573321" sldId="285"/>
-        </pc:sldMkLst>
-      </pc:sldChg>
-      <pc:sldChg chg="modSp add">
-        <pc:chgData name="Md Kauser Ahmmed" userId="81e39d19-8d5c-4ffe-9a82-20799efac8e0" providerId="ADAL" clId="{30EBAA48-D00D-436C-B3AC-B0E7F62EC0CE}" dt="2020-09-04T17:19:45.093" v="1555" actId="20577"/>
-        <pc:sldMkLst>
-          <pc:docMk/>
-          <pc:sldMk cId="4065790106" sldId="286"/>
-        </pc:sldMkLst>
-        <pc:spChg chg="mod">
-          <ac:chgData name="Md Kauser Ahmmed" userId="81e39d19-8d5c-4ffe-9a82-20799efac8e0" providerId="ADAL" clId="{30EBAA48-D00D-436C-B3AC-B0E7F62EC0CE}" dt="2020-09-04T17:19:45.093" v="1555" actId="20577"/>
-          <ac:spMkLst>
-            <pc:docMk/>
-            <pc:sldMk cId="4065790106" sldId="286"/>
-            <ac:spMk id="6" creationId="{1EEBDA52-BE46-433D-AB6E-4D2949F916FF}"/>
-          </ac:spMkLst>
-        </pc:spChg>
-      </pc:sldChg>
-      <pc:sldChg chg="modSp add">
-        <pc:chgData name="Md Kauser Ahmmed" userId="81e39d19-8d5c-4ffe-9a82-20799efac8e0" providerId="ADAL" clId="{30EBAA48-D00D-436C-B3AC-B0E7F62EC0CE}" dt="2020-09-04T17:20:04.603" v="1561" actId="207"/>
-        <pc:sldMkLst>
-          <pc:docMk/>
-          <pc:sldMk cId="4210391493" sldId="287"/>
-        </pc:sldMkLst>
-        <pc:spChg chg="mod">
-          <ac:chgData name="Md Kauser Ahmmed" userId="81e39d19-8d5c-4ffe-9a82-20799efac8e0" providerId="ADAL" clId="{30EBAA48-D00D-436C-B3AC-B0E7F62EC0CE}" dt="2020-09-04T17:20:04.603" v="1561" actId="207"/>
-          <ac:spMkLst>
-            <pc:docMk/>
-            <pc:sldMk cId="4210391493" sldId="287"/>
-            <ac:spMk id="6" creationId="{1EEBDA52-BE46-433D-AB6E-4D2949F916FF}"/>
-          </ac:spMkLst>
-        </pc:spChg>
-      </pc:sldChg>
-      <pc:sldChg chg="modSp add">
-        <pc:chgData name="Md Kauser Ahmmed" userId="81e39d19-8d5c-4ffe-9a82-20799efac8e0" providerId="ADAL" clId="{30EBAA48-D00D-436C-B3AC-B0E7F62EC0CE}" dt="2020-09-04T17:18:12.227" v="1503" actId="57"/>
-        <pc:sldMkLst>
-          <pc:docMk/>
-          <pc:sldMk cId="3020027435" sldId="288"/>
-        </pc:sldMkLst>
-        <pc:spChg chg="mod">
-          <ac:chgData name="Md Kauser Ahmmed" userId="81e39d19-8d5c-4ffe-9a82-20799efac8e0" providerId="ADAL" clId="{30EBAA48-D00D-436C-B3AC-B0E7F62EC0CE}" dt="2020-09-04T17:08:23.476" v="695" actId="20577"/>
-          <ac:spMkLst>
-            <pc:docMk/>
-            <pc:sldMk cId="3020027435" sldId="288"/>
-            <ac:spMk id="2" creationId="{11C6F554-558A-4032-B80E-4A49925BBC1F}"/>
+            <pc:sldMk cId="3655570833" sldId="322"/>
+            <ac:spMk id="4" creationId="{99A68C8A-5588-49E1-A4DF-A8A05A0914B9}"/>
           </ac:spMkLst>
         </pc:spChg>
         <pc:spChg chg="mod">
-          <ac:chgData name="Md Kauser Ahmmed" userId="81e39d19-8d5c-4ffe-9a82-20799efac8e0" providerId="ADAL" clId="{30EBAA48-D00D-436C-B3AC-B0E7F62EC0CE}" dt="2020-09-04T17:18:12.227" v="1503" actId="57"/>
+          <ac:chgData name="Md Kauser Ahmmed" userId="81e39d19-8d5c-4ffe-9a82-20799efac8e0" providerId="ADAL" clId="{2249E5F1-46C3-4B03-B08E-8C23AE925CD5}" dt="2021-05-07T17:18:45.185" v="33" actId="20577"/>
           <ac:spMkLst>
             <pc:docMk/>
-            <pc:sldMk cId="3020027435" sldId="288"/>
-            <ac:spMk id="3" creationId="{FFBD79E3-1E6C-466C-9014-4AD4B20A9108}"/>
+            <pc:sldMk cId="3655570833" sldId="322"/>
+            <ac:spMk id="7" creationId="{917B1247-B9E7-4617-BECD-49BD5173A822}"/>
           </ac:spMkLst>
         </pc:spChg>
+        <pc:picChg chg="del">
+          <ac:chgData name="Md Kauser Ahmmed" userId="81e39d19-8d5c-4ffe-9a82-20799efac8e0" providerId="ADAL" clId="{2249E5F1-46C3-4B03-B08E-8C23AE925CD5}" dt="2021-05-07T17:13:45.286" v="23" actId="478"/>
+          <ac:picMkLst>
+            <pc:docMk/>
+            <pc:sldMk cId="3655570833" sldId="322"/>
+            <ac:picMk id="5" creationId="{2714B5EF-6099-4CE7-811F-F7BCA671BA60}"/>
+          </ac:picMkLst>
+        </pc:picChg>
+        <pc:picChg chg="add mod ord">
+          <ac:chgData name="Md Kauser Ahmmed" userId="81e39d19-8d5c-4ffe-9a82-20799efac8e0" providerId="ADAL" clId="{2249E5F1-46C3-4B03-B08E-8C23AE925CD5}" dt="2021-05-07T17:14:07.887" v="27" actId="167"/>
+          <ac:picMkLst>
+            <pc:docMk/>
+            <pc:sldMk cId="3655570833" sldId="322"/>
+            <ac:picMk id="8" creationId="{64A8F3CD-C17D-4381-B7EE-3DDBB1FC3553}"/>
+          </ac:picMkLst>
+        </pc:picChg>
       </pc:sldChg>
     </pc:docChg>
   </pc:docChgLst>
@@ -1955,7 +2144,7 @@
           <a:p>
             <a:fld id="{E0E6B7C7-F232-4E49-A950-FE41516D56E2}" type="datetimeFigureOut">
               <a:rPr lang="en-US" smtClean="0"/>
-              <a:t>4/26/2021</a:t>
+              <a:t>5/7/2021</a:t>
             </a:fld>
             <a:endParaRPr lang="en-US"/>
           </a:p>
@@ -3023,7 +3212,7 @@
           <a:p>
             <a:fld id="{9D01B9CF-4F71-45CB-B0F9-5377CB0F66EB}" type="datetimeFigureOut">
               <a:rPr lang="en-US" smtClean="0"/>
-              <a:t>4/26/2021</a:t>
+              <a:t>5/7/2021</a:t>
             </a:fld>
             <a:endParaRPr lang="en-US"/>
           </a:p>
@@ -3221,7 +3410,7 @@
           <a:p>
             <a:fld id="{9D01B9CF-4F71-45CB-B0F9-5377CB0F66EB}" type="datetimeFigureOut">
               <a:rPr lang="en-US" smtClean="0"/>
-              <a:t>4/26/2021</a:t>
+              <a:t>5/7/2021</a:t>
             </a:fld>
             <a:endParaRPr lang="en-US"/>
           </a:p>
@@ -3429,7 +3618,7 @@
           <a:p>
             <a:fld id="{9D01B9CF-4F71-45CB-B0F9-5377CB0F66EB}" type="datetimeFigureOut">
               <a:rPr lang="en-US" smtClean="0"/>
-              <a:t>4/26/2021</a:t>
+              <a:t>5/7/2021</a:t>
             </a:fld>
             <a:endParaRPr lang="en-US"/>
           </a:p>
@@ -3627,7 +3816,7 @@
           <a:p>
             <a:fld id="{9D01B9CF-4F71-45CB-B0F9-5377CB0F66EB}" type="datetimeFigureOut">
               <a:rPr lang="en-US" smtClean="0"/>
-              <a:t>4/26/2021</a:t>
+              <a:t>5/7/2021</a:t>
             </a:fld>
             <a:endParaRPr lang="en-US"/>
           </a:p>
@@ -3902,7 +4091,7 @@
           <a:p>
             <a:fld id="{9D01B9CF-4F71-45CB-B0F9-5377CB0F66EB}" type="datetimeFigureOut">
               <a:rPr lang="en-US" smtClean="0"/>
-              <a:t>4/26/2021</a:t>
+              <a:t>5/7/2021</a:t>
             </a:fld>
             <a:endParaRPr lang="en-US"/>
           </a:p>
@@ -4167,7 +4356,7 @@
           <a:p>
             <a:fld id="{9D01B9CF-4F71-45CB-B0F9-5377CB0F66EB}" type="datetimeFigureOut">
               <a:rPr lang="en-US" smtClean="0"/>
-              <a:t>4/26/2021</a:t>
+              <a:t>5/7/2021</a:t>
             </a:fld>
             <a:endParaRPr lang="en-US"/>
           </a:p>
@@ -4579,7 +4768,7 @@
           <a:p>
             <a:fld id="{9D01B9CF-4F71-45CB-B0F9-5377CB0F66EB}" type="datetimeFigureOut">
               <a:rPr lang="en-US" smtClean="0"/>
-              <a:t>4/26/2021</a:t>
+              <a:t>5/7/2021</a:t>
             </a:fld>
             <a:endParaRPr lang="en-US"/>
           </a:p>
@@ -4720,7 +4909,7 @@
           <a:p>
             <a:fld id="{9D01B9CF-4F71-45CB-B0F9-5377CB0F66EB}" type="datetimeFigureOut">
               <a:rPr lang="en-US" smtClean="0"/>
-              <a:t>4/26/2021</a:t>
+              <a:t>5/7/2021</a:t>
             </a:fld>
             <a:endParaRPr lang="en-US"/>
           </a:p>
@@ -4833,7 +5022,7 @@
           <a:p>
             <a:fld id="{9D01B9CF-4F71-45CB-B0F9-5377CB0F66EB}" type="datetimeFigureOut">
               <a:rPr lang="en-US" smtClean="0"/>
-              <a:t>4/26/2021</a:t>
+              <a:t>5/7/2021</a:t>
             </a:fld>
             <a:endParaRPr lang="en-US"/>
           </a:p>
@@ -5144,7 +5333,7 @@
           <a:p>
             <a:fld id="{9D01B9CF-4F71-45CB-B0F9-5377CB0F66EB}" type="datetimeFigureOut">
               <a:rPr lang="en-US" smtClean="0"/>
-              <a:t>4/26/2021</a:t>
+              <a:t>5/7/2021</a:t>
             </a:fld>
             <a:endParaRPr lang="en-US"/>
           </a:p>
@@ -5432,7 +5621,7 @@
           <a:p>
             <a:fld id="{9D01B9CF-4F71-45CB-B0F9-5377CB0F66EB}" type="datetimeFigureOut">
               <a:rPr lang="en-US" smtClean="0"/>
-              <a:t>4/26/2021</a:t>
+              <a:t>5/7/2021</a:t>
             </a:fld>
             <a:endParaRPr lang="en-US"/>
           </a:p>
@@ -5673,7 +5862,7 @@
           <a:p>
             <a:fld id="{9D01B9CF-4F71-45CB-B0F9-5377CB0F66EB}" type="datetimeFigureOut">
               <a:rPr lang="en-US" smtClean="0"/>
-              <a:t>4/26/2021</a:t>
+              <a:t>5/7/2021</a:t>
             </a:fld>
             <a:endParaRPr lang="en-US"/>
           </a:p>
@@ -10846,6 +11035,41 @@
           <a:chExt cx="0" cy="0"/>
         </a:xfrm>
       </p:grpSpPr>
+      <p:pic>
+        <p:nvPicPr>
+          <p:cNvPr id="11" name="Content Placeholder 10" descr="Chart, histogram&#10;&#10;Description automatically generated">
+            <a:extLst>
+              <a:ext uri="{FF2B5EF4-FFF2-40B4-BE49-F238E27FC236}">
+                <a16:creationId xmlns:a16="http://schemas.microsoft.com/office/drawing/2014/main" id="{A249AACE-0BEE-487E-ABCD-8A9AE4F852EE}"/>
+              </a:ext>
+            </a:extLst>
+          </p:cNvPr>
+          <p:cNvPicPr>
+            <a:picLocks noGrp="1" noChangeAspect="1"/>
+          </p:cNvPicPr>
+          <p:nvPr>
+            <p:ph idx="1"/>
+          </p:nvPr>
+        </p:nvPicPr>
+        <p:blipFill>
+          <a:blip r:embed="rId3">
+            <a:extLst>
+              <a:ext uri="{28A0092B-C50C-407E-A947-70E740481C1C}">
+                <a14:useLocalDpi xmlns:a14="http://schemas.microsoft.com/office/drawing/2010/main" val="0"/>
+              </a:ext>
+            </a:extLst>
+          </a:blip>
+          <a:stretch>
+            <a:fillRect/>
+          </a:stretch>
+        </p:blipFill>
+        <p:spPr>
+          <a:xfrm>
+            <a:off x="1516703" y="1825625"/>
+            <a:ext cx="9158594" cy="4351338"/>
+          </a:xfrm>
+        </p:spPr>
+      </p:pic>
       <p:sp>
         <p:nvSpPr>
           <p:cNvPr id="10" name="Rectangle 9">
@@ -10960,44 +11184,6 @@
           </a:p>
         </p:txBody>
       </p:sp>
-      <p:pic>
-        <p:nvPicPr>
-          <p:cNvPr id="5" name="Content Placeholder 4" descr="Chart, histogram&#10;&#10;Description automatically generated">
-            <a:extLst>
-              <a:ext uri="{FF2B5EF4-FFF2-40B4-BE49-F238E27FC236}">
-                <a16:creationId xmlns:a16="http://schemas.microsoft.com/office/drawing/2014/main" id="{EEFDDC02-9CD2-44F7-9F0D-8417C900CFBA}"/>
-              </a:ext>
-            </a:extLst>
-          </p:cNvPr>
-          <p:cNvPicPr>
-            <a:picLocks noGrp="1" noChangeAspect="1"/>
-          </p:cNvPicPr>
-          <p:nvPr>
-            <p:ph idx="1"/>
-          </p:nvPr>
-        </p:nvPicPr>
-        <p:blipFill>
-          <a:blip r:embed="rId3">
-            <a:extLst>
-              <a:ext uri="{28A0092B-C50C-407E-A947-70E740481C1C}">
-                <a14:useLocalDpi xmlns:a14="http://schemas.microsoft.com/office/drawing/2010/main" val="0"/>
-              </a:ext>
-            </a:extLst>
-          </a:blip>
-          <a:stretch>
-            <a:fillRect/>
-          </a:stretch>
-        </p:blipFill>
-        <p:spPr>
-          <a:xfrm>
-            <a:off x="1470528" y="1597737"/>
-            <a:ext cx="9250943" cy="4394199"/>
-          </a:xfrm>
-          <a:prstGeom prst="rect">
-            <a:avLst/>
-          </a:prstGeom>
-        </p:spPr>
-      </p:pic>
       <p:sp>
         <p:nvSpPr>
           <p:cNvPr id="6" name="TextBox 5">
@@ -11028,7 +11214,7 @@
           <a:p>
             <a:r>
               <a:rPr lang="en-US" dirty="0"/>
-              <a:t>For rank 0, vertices having 0 neighbors are iterated 1054733 times. Vertices having the number of neighbors more than 700 are very less. The highest number of neighbors a vertex has is found to be 2362. </a:t>
+              <a:t>For rank 0, vertices having 0 neighbors are iterated 118482 times. Vertices having the number of neighbors more than 700 are very less. The highest number of neighbors a vertex has is found to be 2362. </a:t>
             </a:r>
           </a:p>
         </p:txBody>
@@ -11071,6 +11257,41 @@
           <a:chExt cx="0" cy="0"/>
         </a:xfrm>
       </p:grpSpPr>
+      <p:pic>
+        <p:nvPicPr>
+          <p:cNvPr id="11" name="Content Placeholder 10" descr="Chart&#10;&#10;Description automatically generated">
+            <a:extLst>
+              <a:ext uri="{FF2B5EF4-FFF2-40B4-BE49-F238E27FC236}">
+                <a16:creationId xmlns:a16="http://schemas.microsoft.com/office/drawing/2014/main" id="{CCDA9C82-3A1C-4D12-B3C5-78C733CDAF6B}"/>
+              </a:ext>
+            </a:extLst>
+          </p:cNvPr>
+          <p:cNvPicPr>
+            <a:picLocks noGrp="1" noChangeAspect="1"/>
+          </p:cNvPicPr>
+          <p:nvPr>
+            <p:ph idx="1"/>
+          </p:nvPr>
+        </p:nvPicPr>
+        <p:blipFill>
+          <a:blip r:embed="rId2">
+            <a:extLst>
+              <a:ext uri="{28A0092B-C50C-407E-A947-70E740481C1C}">
+                <a14:useLocalDpi xmlns:a14="http://schemas.microsoft.com/office/drawing/2010/main" val="0"/>
+              </a:ext>
+            </a:extLst>
+          </a:blip>
+          <a:stretch>
+            <a:fillRect/>
+          </a:stretch>
+        </p:blipFill>
+        <p:spPr>
+          <a:xfrm>
+            <a:off x="1516703" y="1825625"/>
+            <a:ext cx="9158594" cy="4351338"/>
+          </a:xfrm>
+        </p:spPr>
+      </p:pic>
       <p:sp>
         <p:nvSpPr>
           <p:cNvPr id="10" name="Rectangle 9">
@@ -11177,44 +11398,6 @@
           </a:p>
         </p:txBody>
       </p:sp>
-      <p:pic>
-        <p:nvPicPr>
-          <p:cNvPr id="5" name="Content Placeholder 4" descr="Chart&#10;&#10;Description automatically generated">
-            <a:extLst>
-              <a:ext uri="{FF2B5EF4-FFF2-40B4-BE49-F238E27FC236}">
-                <a16:creationId xmlns:a16="http://schemas.microsoft.com/office/drawing/2014/main" id="{11706AC4-668D-4A40-86D9-221FFFFA5604}"/>
-              </a:ext>
-            </a:extLst>
-          </p:cNvPr>
-          <p:cNvPicPr>
-            <a:picLocks noGrp="1" noChangeAspect="1"/>
-          </p:cNvPicPr>
-          <p:nvPr>
-            <p:ph idx="1"/>
-          </p:nvPr>
-        </p:nvPicPr>
-        <p:blipFill>
-          <a:blip r:embed="rId2">
-            <a:extLst>
-              <a:ext uri="{28A0092B-C50C-407E-A947-70E740481C1C}">
-                <a14:useLocalDpi xmlns:a14="http://schemas.microsoft.com/office/drawing/2010/main" val="0"/>
-              </a:ext>
-            </a:extLst>
-          </a:blip>
-          <a:stretch>
-            <a:fillRect/>
-          </a:stretch>
-        </p:blipFill>
-        <p:spPr>
-          <a:xfrm>
-            <a:off x="1470528" y="1675227"/>
-            <a:ext cx="9250943" cy="4394199"/>
-          </a:xfrm>
-          <a:prstGeom prst="rect">
-            <a:avLst/>
-          </a:prstGeom>
-        </p:spPr>
-      </p:pic>
       <p:sp>
         <p:nvSpPr>
           <p:cNvPr id="7" name="TextBox 6">
@@ -11245,7 +11428,7 @@
           <a:p>
             <a:r>
               <a:rPr lang="en-US" dirty="0"/>
-              <a:t>For rank 0, vertices having 0 neighbors are iterated 2424347 times. Vertices having the number of neighbors more than 400 are very less frequent. The highest number of neighbors a vertex has is found to be 4334. </a:t>
+              <a:t>For rank 0, vertices having 0 neighbors are iterated 419664 times. Vertices having the number of neighbors more than 400 are very less frequent. The highest number of neighbors a vertex has is found to be 4334. </a:t>
             </a:r>
           </a:p>
         </p:txBody>
@@ -11288,6 +11471,41 @@
           <a:chExt cx="0" cy="0"/>
         </a:xfrm>
       </p:grpSpPr>
+      <p:pic>
+        <p:nvPicPr>
+          <p:cNvPr id="8" name="Content Placeholder 7" descr="Chart, histogram&#10;&#10;Description automatically generated">
+            <a:extLst>
+              <a:ext uri="{FF2B5EF4-FFF2-40B4-BE49-F238E27FC236}">
+                <a16:creationId xmlns:a16="http://schemas.microsoft.com/office/drawing/2014/main" id="{AE426A0B-DB57-4F75-8EE9-F71A7725EA28}"/>
+              </a:ext>
+            </a:extLst>
+          </p:cNvPr>
+          <p:cNvPicPr>
+            <a:picLocks noGrp="1" noChangeAspect="1"/>
+          </p:cNvPicPr>
+          <p:nvPr>
+            <p:ph idx="1"/>
+          </p:nvPr>
+        </p:nvPicPr>
+        <p:blipFill>
+          <a:blip r:embed="rId2">
+            <a:extLst>
+              <a:ext uri="{28A0092B-C50C-407E-A947-70E740481C1C}">
+                <a14:useLocalDpi xmlns:a14="http://schemas.microsoft.com/office/drawing/2010/main" val="0"/>
+              </a:ext>
+            </a:extLst>
+          </a:blip>
+          <a:stretch>
+            <a:fillRect/>
+          </a:stretch>
+        </p:blipFill>
+        <p:spPr>
+          <a:xfrm>
+            <a:off x="1516703" y="1825625"/>
+            <a:ext cx="9158594" cy="4351338"/>
+          </a:xfrm>
+        </p:spPr>
+      </p:pic>
       <p:sp>
         <p:nvSpPr>
           <p:cNvPr id="10" name="Rectangle 9">
@@ -11394,44 +11612,6 @@
           </a:p>
         </p:txBody>
       </p:sp>
-      <p:pic>
-        <p:nvPicPr>
-          <p:cNvPr id="5" name="Content Placeholder 4" descr="Chart, histogram&#10;&#10;Description automatically generated">
-            <a:extLst>
-              <a:ext uri="{FF2B5EF4-FFF2-40B4-BE49-F238E27FC236}">
-                <a16:creationId xmlns:a16="http://schemas.microsoft.com/office/drawing/2014/main" id="{F62B1966-6EEC-43F7-84E0-EA1B2169DAAB}"/>
-              </a:ext>
-            </a:extLst>
-          </p:cNvPr>
-          <p:cNvPicPr>
-            <a:picLocks noGrp="1" noChangeAspect="1"/>
-          </p:cNvPicPr>
-          <p:nvPr>
-            <p:ph idx="1"/>
-          </p:nvPr>
-        </p:nvPicPr>
-        <p:blipFill>
-          <a:blip r:embed="rId2">
-            <a:extLst>
-              <a:ext uri="{28A0092B-C50C-407E-A947-70E740481C1C}">
-                <a14:useLocalDpi xmlns:a14="http://schemas.microsoft.com/office/drawing/2010/main" val="0"/>
-              </a:ext>
-            </a:extLst>
-          </a:blip>
-          <a:stretch>
-            <a:fillRect/>
-          </a:stretch>
-        </p:blipFill>
-        <p:spPr>
-          <a:xfrm>
-            <a:off x="1470528" y="1675227"/>
-            <a:ext cx="9250943" cy="4394199"/>
-          </a:xfrm>
-          <a:prstGeom prst="rect">
-            <a:avLst/>
-          </a:prstGeom>
-        </p:spPr>
-      </p:pic>
       <p:sp>
         <p:nvSpPr>
           <p:cNvPr id="7" name="TextBox 6">
@@ -11462,7 +11642,7 @@
           <a:p>
             <a:r>
               <a:rPr lang="en-US" dirty="0"/>
-              <a:t>For rank 0, vertices having 0 neighbors are iterated 1311993 times. Vertices having the number of neighbors more than 300 are very less frequent. The highest number of neighbors a vertex has is found to be 9609. </a:t>
+              <a:t>For rank 0, vertices having 0 neighbors are iterated 105494 times. Vertices having the number of neighbors more than 300 are very less frequent. The highest number of neighbors a vertex has is found to be 9609. </a:t>
             </a:r>
           </a:p>
         </p:txBody>
@@ -11505,6 +11685,41 @@
           <a:chExt cx="0" cy="0"/>
         </a:xfrm>
       </p:grpSpPr>
+      <p:pic>
+        <p:nvPicPr>
+          <p:cNvPr id="8" name="Content Placeholder 7" descr="Chart&#10;&#10;Description automatically generated">
+            <a:extLst>
+              <a:ext uri="{FF2B5EF4-FFF2-40B4-BE49-F238E27FC236}">
+                <a16:creationId xmlns:a16="http://schemas.microsoft.com/office/drawing/2014/main" id="{64A8F3CD-C17D-4381-B7EE-3DDBB1FC3553}"/>
+              </a:ext>
+            </a:extLst>
+          </p:cNvPr>
+          <p:cNvPicPr>
+            <a:picLocks noGrp="1" noChangeAspect="1"/>
+          </p:cNvPicPr>
+          <p:nvPr>
+            <p:ph idx="1"/>
+          </p:nvPr>
+        </p:nvPicPr>
+        <p:blipFill>
+          <a:blip r:embed="rId2">
+            <a:extLst>
+              <a:ext uri="{28A0092B-C50C-407E-A947-70E740481C1C}">
+                <a14:useLocalDpi xmlns:a14="http://schemas.microsoft.com/office/drawing/2010/main" val="0"/>
+              </a:ext>
+            </a:extLst>
+          </a:blip>
+          <a:stretch>
+            <a:fillRect/>
+          </a:stretch>
+        </p:blipFill>
+        <p:spPr>
+          <a:xfrm>
+            <a:off x="1516703" y="1825625"/>
+            <a:ext cx="9158594" cy="4351338"/>
+          </a:xfrm>
+        </p:spPr>
+      </p:pic>
       <p:sp>
         <p:nvSpPr>
           <p:cNvPr id="10" name="Rectangle 9">
@@ -11611,44 +11826,6 @@
           </a:p>
         </p:txBody>
       </p:sp>
-      <p:pic>
-        <p:nvPicPr>
-          <p:cNvPr id="5" name="Content Placeholder 4" descr="Chart&#10;&#10;Description automatically generated">
-            <a:extLst>
-              <a:ext uri="{FF2B5EF4-FFF2-40B4-BE49-F238E27FC236}">
-                <a16:creationId xmlns:a16="http://schemas.microsoft.com/office/drawing/2014/main" id="{2714B5EF-6099-4CE7-811F-F7BCA671BA60}"/>
-              </a:ext>
-            </a:extLst>
-          </p:cNvPr>
-          <p:cNvPicPr>
-            <a:picLocks noGrp="1" noChangeAspect="1"/>
-          </p:cNvPicPr>
-          <p:nvPr>
-            <p:ph idx="1"/>
-          </p:nvPr>
-        </p:nvPicPr>
-        <p:blipFill>
-          <a:blip r:embed="rId2">
-            <a:extLst>
-              <a:ext uri="{28A0092B-C50C-407E-A947-70E740481C1C}">
-                <a14:useLocalDpi xmlns:a14="http://schemas.microsoft.com/office/drawing/2010/main" val="0"/>
-              </a:ext>
-            </a:extLst>
-          </a:blip>
-          <a:stretch>
-            <a:fillRect/>
-          </a:stretch>
-        </p:blipFill>
-        <p:spPr>
-          <a:xfrm>
-            <a:off x="1470528" y="1675227"/>
-            <a:ext cx="9250943" cy="4394199"/>
-          </a:xfrm>
-          <a:prstGeom prst="rect">
-            <a:avLst/>
-          </a:prstGeom>
-        </p:spPr>
-      </p:pic>
       <p:sp>
         <p:nvSpPr>
           <p:cNvPr id="7" name="TextBox 6">
@@ -11679,7 +11856,15 @@
           <a:p>
             <a:r>
               <a:rPr lang="en-US" dirty="0"/>
-              <a:t>For rank 0, vertices having 0 neighbors are iterated 829278 times. Vertices having the number of neighbors more than 200 are very less frequent. The highest number of neighbors a vertex has is found to be 28576. </a:t>
+              <a:t>For rank 0, vertices having 0 neighbors are iterated 169736 times. Vertices having the number of neighbors more </a:t>
+            </a:r>
+            <a:r>
+              <a:rPr lang="en-US"/>
+              <a:t>than 300 </a:t>
+            </a:r>
+            <a:r>
+              <a:rPr lang="en-US" dirty="0"/>
+              <a:t>are very less frequent. The highest number of neighbors a vertex has is found to be 28576. </a:t>
             </a:r>
           </a:p>
         </p:txBody>

</xml_diff>